<commit_message>
Adding memory for offloads slide pack and pictures
git-svn-id: https://svn.code.sf.net/p/cpp-lects-rus/code/trunk@531 39143b06-f351-456c-9f92-4cd32fad6823
</commit_message>
<xml_diff>
--- a/other_lects/toolchain_lect/slides/graphics_toolchain_complete_ppt.pptx
+++ b/other_lects/toolchain_lect/slides/graphics_toolchain_complete_ppt.pptx
@@ -5,10 +5,10 @@
     <p:sldMasterId id="2147483648" r:id="rId1"/>
   </p:sldMasterIdLst>
   <p:notesMasterIdLst>
-    <p:notesMasterId r:id="rId51"/>
+    <p:notesMasterId r:id="rId52"/>
   </p:notesMasterIdLst>
   <p:handoutMasterIdLst>
-    <p:handoutMasterId r:id="rId52"/>
+    <p:handoutMasterId r:id="rId53"/>
   </p:handoutMasterIdLst>
   <p:sldIdLst>
     <p:sldId id="460" r:id="rId2"/>
@@ -60,6 +60,7 @@
     <p:sldId id="501" r:id="rId48"/>
     <p:sldId id="493" r:id="rId49"/>
     <p:sldId id="490" r:id="rId50"/>
+    <p:sldId id="502" r:id="rId51"/>
   </p:sldIdLst>
   <p:sldSz cx="10080625" cy="7559675"/>
   <p:notesSz cx="7559675" cy="10691813"/>
@@ -34584,10 +34585,10 @@
       </p:sp>
       <p:pic>
         <p:nvPicPr>
-          <p:cNvPr id="5" name="Рисунок 4">
+          <p:cNvPr id="6" name="Рисунок 5">
             <a:extLst>
               <a:ext uri="{FF2B5EF4-FFF2-40B4-BE49-F238E27FC236}">
-                <a16:creationId xmlns:a16="http://schemas.microsoft.com/office/drawing/2014/main" id="{482A877C-9377-8108-5613-FB3CB22F275E}"/>
+                <a16:creationId xmlns:a16="http://schemas.microsoft.com/office/drawing/2014/main" id="{A78F1005-236C-BDB1-2761-062379631A4D}"/>
               </a:ext>
             </a:extLst>
           </p:cNvPr>
@@ -34610,14 +34611,407 @@
         </p:blipFill>
         <p:spPr>
           <a:xfrm>
-            <a:off x="7232613" y="1497496"/>
-            <a:ext cx="2709091" cy="5996609"/>
+            <a:off x="503999" y="1497496"/>
+            <a:ext cx="7743825" cy="3429000"/>
           </a:xfrm>
           <a:prstGeom prst="rect">
             <a:avLst/>
           </a:prstGeom>
         </p:spPr>
       </p:pic>
+      <p:pic>
+        <p:nvPicPr>
+          <p:cNvPr id="5" name="Рисунок 4">
+            <a:extLst>
+              <a:ext uri="{FF2B5EF4-FFF2-40B4-BE49-F238E27FC236}">
+                <a16:creationId xmlns:a16="http://schemas.microsoft.com/office/drawing/2014/main" id="{482A877C-9377-8108-5613-FB3CB22F275E}"/>
+              </a:ext>
+            </a:extLst>
+          </p:cNvPr>
+          <p:cNvPicPr>
+            <a:picLocks noChangeAspect="1"/>
+          </p:cNvPicPr>
+          <p:nvPr/>
+        </p:nvPicPr>
+        <p:blipFill>
+          <a:blip r:embed="rId3">
+            <a:extLst>
+              <a:ext uri="{28A0092B-C50C-407E-A947-70E740481C1C}">
+                <a14:useLocalDpi xmlns:a14="http://schemas.microsoft.com/office/drawing/2010/main" val="0"/>
+              </a:ext>
+            </a:extLst>
+          </a:blip>
+          <a:stretch>
+            <a:fillRect/>
+          </a:stretch>
+        </p:blipFill>
+        <p:spPr>
+          <a:xfrm>
+            <a:off x="8110331" y="1331845"/>
+            <a:ext cx="1746326" cy="3865516"/>
+          </a:xfrm>
+          <a:prstGeom prst="rect">
+            <a:avLst/>
+          </a:prstGeom>
+        </p:spPr>
+      </p:pic>
+      <p:sp>
+        <p:nvSpPr>
+          <p:cNvPr id="7" name="Полилиния: фигура 6">
+            <a:extLst>
+              <a:ext uri="{FF2B5EF4-FFF2-40B4-BE49-F238E27FC236}">
+                <a16:creationId xmlns:a16="http://schemas.microsoft.com/office/drawing/2014/main" id="{CB7865F8-4A09-C2B8-7CB9-DCDE37557E64}"/>
+              </a:ext>
+            </a:extLst>
+          </p:cNvPr>
+          <p:cNvSpPr/>
+          <p:nvPr/>
+        </p:nvSpPr>
+        <p:spPr>
+          <a:xfrm>
+            <a:off x="503999" y="5216548"/>
+            <a:ext cx="8454471" cy="1747469"/>
+          </a:xfrm>
+          <a:custGeom>
+            <a:avLst>
+              <a:gd name="f0" fmla="val 3600"/>
+            </a:avLst>
+            <a:gdLst>
+              <a:gd name="f1" fmla="val 10800000"/>
+              <a:gd name="f2" fmla="val 5400000"/>
+              <a:gd name="f3" fmla="val 16200000"/>
+              <a:gd name="f4" fmla="val w"/>
+              <a:gd name="f5" fmla="val h"/>
+              <a:gd name="f6" fmla="val ss"/>
+              <a:gd name="f7" fmla="val 0"/>
+              <a:gd name="f8" fmla="*/ 5419351 1 1725033"/>
+              <a:gd name="f9" fmla="val 45"/>
+              <a:gd name="f10" fmla="val 10800"/>
+              <a:gd name="f11" fmla="val -2147483647"/>
+              <a:gd name="f12" fmla="val 2147483647"/>
+              <a:gd name="f13" fmla="abs f4"/>
+              <a:gd name="f14" fmla="abs f5"/>
+              <a:gd name="f15" fmla="abs f6"/>
+              <a:gd name="f16" fmla="*/ f8 1 180"/>
+              <a:gd name="f17" fmla="pin 0 f0 10800"/>
+              <a:gd name="f18" fmla="+- 0 0 f2"/>
+              <a:gd name="f19" fmla="?: f13 f4 1"/>
+              <a:gd name="f20" fmla="?: f14 f5 1"/>
+              <a:gd name="f21" fmla="?: f15 f6 1"/>
+              <a:gd name="f22" fmla="*/ f9 f16 1"/>
+              <a:gd name="f23" fmla="+- f7 f17 0"/>
+              <a:gd name="f24" fmla="*/ f19 1 21600"/>
+              <a:gd name="f25" fmla="*/ f20 1 21600"/>
+              <a:gd name="f26" fmla="*/ 21600 f19 1"/>
+              <a:gd name="f27" fmla="*/ 21600 f20 1"/>
+              <a:gd name="f28" fmla="+- 0 0 f22"/>
+              <a:gd name="f29" fmla="min f25 f24"/>
+              <a:gd name="f30" fmla="*/ f26 1 f21"/>
+              <a:gd name="f31" fmla="*/ f27 1 f21"/>
+              <a:gd name="f32" fmla="*/ f28 f1 1"/>
+              <a:gd name="f33" fmla="*/ f32 1 f8"/>
+              <a:gd name="f34" fmla="+- f31 0 f17"/>
+              <a:gd name="f35" fmla="+- f30 0 f17"/>
+              <a:gd name="f36" fmla="*/ f17 f29 1"/>
+              <a:gd name="f37" fmla="*/ f7 f29 1"/>
+              <a:gd name="f38" fmla="*/ f23 f29 1"/>
+              <a:gd name="f39" fmla="*/ f31 f29 1"/>
+              <a:gd name="f40" fmla="*/ f30 f29 1"/>
+              <a:gd name="f41" fmla="+- f33 0 f2"/>
+              <a:gd name="f42" fmla="+- f37 0 f38"/>
+              <a:gd name="f43" fmla="+- f38 0 f37"/>
+              <a:gd name="f44" fmla="*/ f34 f29 1"/>
+              <a:gd name="f45" fmla="*/ f35 f29 1"/>
+              <a:gd name="f46" fmla="cos 1 f41"/>
+              <a:gd name="f47" fmla="abs f42"/>
+              <a:gd name="f48" fmla="abs f43"/>
+              <a:gd name="f49" fmla="?: f42 f18 f2"/>
+              <a:gd name="f50" fmla="?: f42 f2 f18"/>
+              <a:gd name="f51" fmla="?: f42 f3 f2"/>
+              <a:gd name="f52" fmla="?: f42 f2 f3"/>
+              <a:gd name="f53" fmla="+- f39 0 f44"/>
+              <a:gd name="f54" fmla="?: f43 f18 f2"/>
+              <a:gd name="f55" fmla="?: f43 f2 f18"/>
+              <a:gd name="f56" fmla="+- f40 0 f45"/>
+              <a:gd name="f57" fmla="+- f44 0 f39"/>
+              <a:gd name="f58" fmla="+- f45 0 f40"/>
+              <a:gd name="f59" fmla="?: f42 0 f1"/>
+              <a:gd name="f60" fmla="?: f42 f1 0"/>
+              <a:gd name="f61" fmla="+- 0 0 f46"/>
+              <a:gd name="f62" fmla="?: f42 f52 f51"/>
+              <a:gd name="f63" fmla="?: f42 f51 f52"/>
+              <a:gd name="f64" fmla="?: f43 f50 f49"/>
+              <a:gd name="f65" fmla="abs f53"/>
+              <a:gd name="f66" fmla="?: f53 0 f1"/>
+              <a:gd name="f67" fmla="?: f53 f1 0"/>
+              <a:gd name="f68" fmla="?: f53 f54 f55"/>
+              <a:gd name="f69" fmla="abs f56"/>
+              <a:gd name="f70" fmla="abs f57"/>
+              <a:gd name="f71" fmla="?: f56 f18 f2"/>
+              <a:gd name="f72" fmla="?: f56 f2 f18"/>
+              <a:gd name="f73" fmla="?: f56 f3 f2"/>
+              <a:gd name="f74" fmla="?: f56 f2 f3"/>
+              <a:gd name="f75" fmla="abs f58"/>
+              <a:gd name="f76" fmla="?: f58 f18 f2"/>
+              <a:gd name="f77" fmla="?: f58 f2 f18"/>
+              <a:gd name="f78" fmla="?: f58 f60 f59"/>
+              <a:gd name="f79" fmla="?: f58 f59 f60"/>
+              <a:gd name="f80" fmla="*/ f17 f61 1"/>
+              <a:gd name="f81" fmla="?: f43 f63 f62"/>
+              <a:gd name="f82" fmla="?: f43 f67 f66"/>
+              <a:gd name="f83" fmla="?: f43 f66 f67"/>
+              <a:gd name="f84" fmla="?: f56 f74 f73"/>
+              <a:gd name="f85" fmla="?: f56 f73 f74"/>
+              <a:gd name="f86" fmla="?: f57 f72 f71"/>
+              <a:gd name="f87" fmla="?: f42 f78 f79"/>
+              <a:gd name="f88" fmla="?: f42 f76 f77"/>
+              <a:gd name="f89" fmla="*/ f80 3163 1"/>
+              <a:gd name="f90" fmla="?: f53 f82 f83"/>
+              <a:gd name="f91" fmla="?: f57 f85 f84"/>
+              <a:gd name="f92" fmla="*/ f89 1 7636"/>
+              <a:gd name="f93" fmla="+- f7 f92 0"/>
+              <a:gd name="f94" fmla="+- f30 0 f92"/>
+              <a:gd name="f95" fmla="+- f31 0 f92"/>
+              <a:gd name="f96" fmla="*/ f93 f29 1"/>
+              <a:gd name="f97" fmla="*/ f94 f29 1"/>
+              <a:gd name="f98" fmla="*/ f95 f29 1"/>
+            </a:gdLst>
+            <a:ahLst>
+              <a:ahXY gdRefX="f0" minX="f7" maxX="f10">
+                <a:pos x="f36" y="f37"/>
+              </a:ahXY>
+            </a:ahLst>
+            <a:cxnLst>
+              <a:cxn ang="3cd4">
+                <a:pos x="hc" y="t"/>
+              </a:cxn>
+              <a:cxn ang="0">
+                <a:pos x="r" y="vc"/>
+              </a:cxn>
+              <a:cxn ang="cd4">
+                <a:pos x="hc" y="b"/>
+              </a:cxn>
+              <a:cxn ang="cd2">
+                <a:pos x="l" y="vc"/>
+              </a:cxn>
+            </a:cxnLst>
+            <a:rect l="f96" t="f96" r="f97" b="f98"/>
+            <a:pathLst>
+              <a:path>
+                <a:moveTo>
+                  <a:pt x="f38" y="f37"/>
+                </a:moveTo>
+                <a:arcTo wR="f47" hR="f48" stAng="f81" swAng="f64"/>
+                <a:lnTo>
+                  <a:pt x="f37" y="f44"/>
+                </a:lnTo>
+                <a:arcTo wR="f48" hR="f65" stAng="f90" swAng="f68"/>
+                <a:lnTo>
+                  <a:pt x="f45" y="f39"/>
+                </a:lnTo>
+                <a:arcTo wR="f69" hR="f70" stAng="f91" swAng="f86"/>
+                <a:lnTo>
+                  <a:pt x="f40" y="f38"/>
+                </a:lnTo>
+                <a:arcTo wR="f75" hR="f47" stAng="f87" swAng="f88"/>
+                <a:close/>
+              </a:path>
+            </a:pathLst>
+          </a:custGeom>
+          <a:solidFill>
+            <a:srgbClr val="FFFFFF"/>
+          </a:solidFill>
+          <a:ln w="29160">
+            <a:solidFill>
+              <a:srgbClr val="3465A4"/>
+            </a:solidFill>
+            <a:prstDash val="solid"/>
+          </a:ln>
+        </p:spPr>
+        <p:txBody>
+          <a:bodyPr vert="horz" wrap="none" lIns="104400" tIns="59400" rIns="104400" bIns="59400" anchor="ctr" anchorCtr="0" compatLnSpc="0">
+            <a:noAutofit/>
+          </a:bodyPr>
+          <a:lstStyle/>
+          <a:p>
+            <a:pPr marL="0" marR="0" lvl="0" indent="0" algn="l" rtl="0" hangingPunct="0">
+              <a:lnSpc>
+                <a:spcPct val="100000"/>
+              </a:lnSpc>
+              <a:spcBef>
+                <a:spcPts val="0"/>
+              </a:spcBef>
+              <a:spcAft>
+                <a:spcPts val="0"/>
+              </a:spcAft>
+              <a:buNone/>
+              <a:tabLst/>
+            </a:pPr>
+            <a:r>
+              <a:rPr lang="en-US" sz="1600" b="0" i="0" u="none" strike="noStrike" kern="1200" cap="none">
+                <a:ln>
+                  <a:noFill/>
+                </a:ln>
+                <a:latin typeface="Consolas" panose="020B0609020204030204" pitchFamily="49" charset="0"/>
+                <a:ea typeface="Droid Sans Fallback" pitchFamily="2"/>
+                <a:cs typeface="FreeSans" pitchFamily="2"/>
+              </a:rPr>
+              <a:t>define spir_kernel void </a:t>
+            </a:r>
+            <a:br>
+              <a:rPr lang="en-US" sz="1600" b="0" i="0" u="none" strike="noStrike" kern="1200" cap="none">
+                <a:ln>
+                  <a:noFill/>
+                </a:ln>
+                <a:latin typeface="Consolas" panose="020B0609020204030204" pitchFamily="49" charset="0"/>
+                <a:ea typeface="Droid Sans Fallback" pitchFamily="2"/>
+                <a:cs typeface="FreeSans" pitchFamily="2"/>
+              </a:rPr>
+            </a:br>
+            <a:r>
+              <a:rPr lang="en-US" sz="1600" b="0" i="0" u="none" strike="noStrike" kern="1200" cap="none">
+                <a:ln>
+                  <a:noFill/>
+                </a:ln>
+                <a:latin typeface="Consolas" panose="020B0609020204030204" pitchFamily="49" charset="0"/>
+                <a:ea typeface="Droid Sans Fallback" pitchFamily="2"/>
+                <a:cs typeface="FreeSans" pitchFamily="2"/>
+              </a:rPr>
+              <a:t>@_ZTS14vector_add_bufIiE(i32 addrspace(1)* readonly %0, </a:t>
+            </a:r>
+            <a:br>
+              <a:rPr lang="en-US" sz="1600" b="0" i="0" u="none" strike="noStrike" kern="1200" cap="none">
+                <a:ln>
+                  <a:noFill/>
+                </a:ln>
+                <a:latin typeface="Consolas" panose="020B0609020204030204" pitchFamily="49" charset="0"/>
+                <a:ea typeface="Droid Sans Fallback" pitchFamily="2"/>
+                <a:cs typeface="FreeSans" pitchFamily="2"/>
+              </a:rPr>
+            </a:br>
+            <a:r>
+              <a:rPr lang="en-US" sz="1600" b="0" i="0" u="none" strike="noStrike" kern="1200" cap="none">
+                <a:ln>
+                  <a:noFill/>
+                </a:ln>
+                <a:latin typeface="Consolas" panose="020B0609020204030204" pitchFamily="49" charset="0"/>
+                <a:ea typeface="Droid Sans Fallback" pitchFamily="2"/>
+                <a:cs typeface="FreeSans" pitchFamily="2"/>
+              </a:rPr>
+              <a:t>  %range* byval %1, %range* byval %2, %range* byval %3, </a:t>
+            </a:r>
+            <a:br>
+              <a:rPr lang="en-US" sz="1600" b="0" i="0" u="none" strike="noStrike" kern="1200" cap="none">
+                <a:ln>
+                  <a:noFill/>
+                </a:ln>
+                <a:latin typeface="Consolas" panose="020B0609020204030204" pitchFamily="49" charset="0"/>
+                <a:ea typeface="Droid Sans Fallback" pitchFamily="2"/>
+                <a:cs typeface="FreeSans" pitchFamily="2"/>
+              </a:rPr>
+            </a:br>
+            <a:r>
+              <a:rPr lang="en-US" sz="1600" b="0" i="0" u="none" strike="noStrike" kern="1200" cap="none">
+                <a:ln>
+                  <a:noFill/>
+                </a:ln>
+                <a:solidFill>
+                  <a:schemeClr val="bg1">
+                    <a:lumMod val="50000"/>
+                  </a:schemeClr>
+                </a:solidFill>
+                <a:latin typeface="Consolas" panose="020B0609020204030204" pitchFamily="49" charset="0"/>
+                <a:ea typeface="Droid Sans Fallback" pitchFamily="2"/>
+                <a:cs typeface="FreeSans" pitchFamily="2"/>
+              </a:rPr>
+              <a:t>  .....</a:t>
+            </a:r>
+            <a:br>
+              <a:rPr lang="en-US" sz="1600" b="0" i="0" u="none" strike="noStrike" kern="1200" cap="none">
+                <a:ln>
+                  <a:noFill/>
+                </a:ln>
+                <a:latin typeface="Consolas" panose="020B0609020204030204" pitchFamily="49" charset="0"/>
+                <a:ea typeface="Droid Sans Fallback" pitchFamily="2"/>
+                <a:cs typeface="FreeSans" pitchFamily="2"/>
+              </a:rPr>
+            </a:br>
+            <a:r>
+              <a:rPr lang="en-US" sz="1600" b="0" i="0" u="none" strike="noStrike" kern="1200" cap="none">
+                <a:ln>
+                  <a:noFill/>
+                </a:ln>
+                <a:latin typeface="Consolas" panose="020B0609020204030204" pitchFamily="49" charset="0"/>
+                <a:ea typeface="Droid Sans Fallback" pitchFamily="2"/>
+                <a:cs typeface="FreeSans" pitchFamily="2"/>
+              </a:rPr>
+              <a:t>  </a:t>
+            </a:r>
+            <a:r>
+              <a:rPr lang="en-US" sz="1600" b="0" i="0" u="none" strike="noStrike" kern="1200" cap="none">
+                <a:ln>
+                  <a:noFill/>
+                </a:ln>
+                <a:solidFill>
+                  <a:srgbClr val="0000FF"/>
+                </a:solidFill>
+                <a:latin typeface="Consolas" panose="020B0609020204030204" pitchFamily="49" charset="0"/>
+                <a:ea typeface="Droid Sans Fallback" pitchFamily="2"/>
+                <a:cs typeface="FreeSans" pitchFamily="2"/>
+              </a:rPr>
+              <a:t>&lt;8 x i32&gt; %r0, &lt;8 x i32&gt; %payloadHeader, &lt;3 x i32&gt; %enqueuedLocalSize,</a:t>
+            </a:r>
+            <a:r>
+              <a:rPr lang="en-US" sz="1600" b="0" i="0" u="none" strike="noStrike" kern="1200" cap="none">
+                <a:ln>
+                  <a:noFill/>
+                </a:ln>
+                <a:latin typeface="Consolas" panose="020B0609020204030204" pitchFamily="49" charset="0"/>
+                <a:ea typeface="Droid Sans Fallback" pitchFamily="2"/>
+                <a:cs typeface="FreeSans" pitchFamily="2"/>
+              </a:rPr>
+              <a:t> </a:t>
+            </a:r>
+            <a:br>
+              <a:rPr lang="en-US" sz="1600" b="0" i="0" u="none" strike="noStrike" kern="1200" cap="none">
+                <a:ln>
+                  <a:noFill/>
+                </a:ln>
+                <a:latin typeface="Consolas" panose="020B0609020204030204" pitchFamily="49" charset="0"/>
+                <a:ea typeface="Droid Sans Fallback" pitchFamily="2"/>
+                <a:cs typeface="FreeSans" pitchFamily="2"/>
+              </a:rPr>
+            </a:br>
+            <a:r>
+              <a:rPr lang="en-US" sz="1600" b="0" i="0" u="none" strike="noStrike" kern="1200" cap="none">
+                <a:ln>
+                  <a:noFill/>
+                </a:ln>
+                <a:latin typeface="Consolas" panose="020B0609020204030204" pitchFamily="49" charset="0"/>
+                <a:ea typeface="Droid Sans Fallback" pitchFamily="2"/>
+                <a:cs typeface="FreeSans" pitchFamily="2"/>
+              </a:rPr>
+              <a:t>  i16 %localIdX, i16 %localIdY, i16 %localIdZ, i8* %privateBase, </a:t>
+            </a:r>
+            <a:r>
+              <a:rPr lang="en-US" sz="1600" b="0" i="0" u="none" strike="noStrike" kern="1200" cap="none">
+                <a:ln>
+                  <a:noFill/>
+                </a:ln>
+                <a:solidFill>
+                  <a:schemeClr val="bg1">
+                    <a:lumMod val="50000"/>
+                  </a:schemeClr>
+                </a:solidFill>
+                <a:latin typeface="Consolas" panose="020B0609020204030204" pitchFamily="49" charset="0"/>
+                <a:ea typeface="Droid Sans Fallback" pitchFamily="2"/>
+                <a:cs typeface="FreeSans" pitchFamily="2"/>
+              </a:rPr>
+              <a:t>....</a:t>
+            </a:r>
+          </a:p>
+        </p:txBody>
+      </p:sp>
     </p:spTree>
     <p:extLst>
       <p:ext uri="{BB962C8B-B14F-4D97-AF65-F5344CB8AC3E}">
@@ -34650,6 +35044,310 @@
       </p:grpSpPr>
       <p:sp>
         <p:nvSpPr>
+          <p:cNvPr id="10" name="Полилиния: фигура 9">
+            <a:extLst>
+              <a:ext uri="{FF2B5EF4-FFF2-40B4-BE49-F238E27FC236}">
+                <a16:creationId xmlns:a16="http://schemas.microsoft.com/office/drawing/2014/main" id="{E4E2914B-5D9E-AB2C-4A4D-FCC060182BA5}"/>
+              </a:ext>
+            </a:extLst>
+          </p:cNvPr>
+          <p:cNvSpPr/>
+          <p:nvPr/>
+        </p:nvSpPr>
+        <p:spPr>
+          <a:xfrm>
+            <a:off x="378102" y="3545047"/>
+            <a:ext cx="9071639" cy="3418970"/>
+          </a:xfrm>
+          <a:custGeom>
+            <a:avLst>
+              <a:gd name="f0" fmla="val 3600"/>
+            </a:avLst>
+            <a:gdLst>
+              <a:gd name="f1" fmla="val 10800000"/>
+              <a:gd name="f2" fmla="val 5400000"/>
+              <a:gd name="f3" fmla="val 16200000"/>
+              <a:gd name="f4" fmla="val w"/>
+              <a:gd name="f5" fmla="val h"/>
+              <a:gd name="f6" fmla="val ss"/>
+              <a:gd name="f7" fmla="val 0"/>
+              <a:gd name="f8" fmla="*/ 5419351 1 1725033"/>
+              <a:gd name="f9" fmla="val 45"/>
+              <a:gd name="f10" fmla="val 10800"/>
+              <a:gd name="f11" fmla="val -2147483647"/>
+              <a:gd name="f12" fmla="val 2147483647"/>
+              <a:gd name="f13" fmla="abs f4"/>
+              <a:gd name="f14" fmla="abs f5"/>
+              <a:gd name="f15" fmla="abs f6"/>
+              <a:gd name="f16" fmla="*/ f8 1 180"/>
+              <a:gd name="f17" fmla="pin 0 f0 10800"/>
+              <a:gd name="f18" fmla="+- 0 0 f2"/>
+              <a:gd name="f19" fmla="?: f13 f4 1"/>
+              <a:gd name="f20" fmla="?: f14 f5 1"/>
+              <a:gd name="f21" fmla="?: f15 f6 1"/>
+              <a:gd name="f22" fmla="*/ f9 f16 1"/>
+              <a:gd name="f23" fmla="+- f7 f17 0"/>
+              <a:gd name="f24" fmla="*/ f19 1 21600"/>
+              <a:gd name="f25" fmla="*/ f20 1 21600"/>
+              <a:gd name="f26" fmla="*/ 21600 f19 1"/>
+              <a:gd name="f27" fmla="*/ 21600 f20 1"/>
+              <a:gd name="f28" fmla="+- 0 0 f22"/>
+              <a:gd name="f29" fmla="min f25 f24"/>
+              <a:gd name="f30" fmla="*/ f26 1 f21"/>
+              <a:gd name="f31" fmla="*/ f27 1 f21"/>
+              <a:gd name="f32" fmla="*/ f28 f1 1"/>
+              <a:gd name="f33" fmla="*/ f32 1 f8"/>
+              <a:gd name="f34" fmla="+- f31 0 f17"/>
+              <a:gd name="f35" fmla="+- f30 0 f17"/>
+              <a:gd name="f36" fmla="*/ f17 f29 1"/>
+              <a:gd name="f37" fmla="*/ f7 f29 1"/>
+              <a:gd name="f38" fmla="*/ f23 f29 1"/>
+              <a:gd name="f39" fmla="*/ f31 f29 1"/>
+              <a:gd name="f40" fmla="*/ f30 f29 1"/>
+              <a:gd name="f41" fmla="+- f33 0 f2"/>
+              <a:gd name="f42" fmla="+- f37 0 f38"/>
+              <a:gd name="f43" fmla="+- f38 0 f37"/>
+              <a:gd name="f44" fmla="*/ f34 f29 1"/>
+              <a:gd name="f45" fmla="*/ f35 f29 1"/>
+              <a:gd name="f46" fmla="cos 1 f41"/>
+              <a:gd name="f47" fmla="abs f42"/>
+              <a:gd name="f48" fmla="abs f43"/>
+              <a:gd name="f49" fmla="?: f42 f18 f2"/>
+              <a:gd name="f50" fmla="?: f42 f2 f18"/>
+              <a:gd name="f51" fmla="?: f42 f3 f2"/>
+              <a:gd name="f52" fmla="?: f42 f2 f3"/>
+              <a:gd name="f53" fmla="+- f39 0 f44"/>
+              <a:gd name="f54" fmla="?: f43 f18 f2"/>
+              <a:gd name="f55" fmla="?: f43 f2 f18"/>
+              <a:gd name="f56" fmla="+- f40 0 f45"/>
+              <a:gd name="f57" fmla="+- f44 0 f39"/>
+              <a:gd name="f58" fmla="+- f45 0 f40"/>
+              <a:gd name="f59" fmla="?: f42 0 f1"/>
+              <a:gd name="f60" fmla="?: f42 f1 0"/>
+              <a:gd name="f61" fmla="+- 0 0 f46"/>
+              <a:gd name="f62" fmla="?: f42 f52 f51"/>
+              <a:gd name="f63" fmla="?: f42 f51 f52"/>
+              <a:gd name="f64" fmla="?: f43 f50 f49"/>
+              <a:gd name="f65" fmla="abs f53"/>
+              <a:gd name="f66" fmla="?: f53 0 f1"/>
+              <a:gd name="f67" fmla="?: f53 f1 0"/>
+              <a:gd name="f68" fmla="?: f53 f54 f55"/>
+              <a:gd name="f69" fmla="abs f56"/>
+              <a:gd name="f70" fmla="abs f57"/>
+              <a:gd name="f71" fmla="?: f56 f18 f2"/>
+              <a:gd name="f72" fmla="?: f56 f2 f18"/>
+              <a:gd name="f73" fmla="?: f56 f3 f2"/>
+              <a:gd name="f74" fmla="?: f56 f2 f3"/>
+              <a:gd name="f75" fmla="abs f58"/>
+              <a:gd name="f76" fmla="?: f58 f18 f2"/>
+              <a:gd name="f77" fmla="?: f58 f2 f18"/>
+              <a:gd name="f78" fmla="?: f58 f60 f59"/>
+              <a:gd name="f79" fmla="?: f58 f59 f60"/>
+              <a:gd name="f80" fmla="*/ f17 f61 1"/>
+              <a:gd name="f81" fmla="?: f43 f63 f62"/>
+              <a:gd name="f82" fmla="?: f43 f67 f66"/>
+              <a:gd name="f83" fmla="?: f43 f66 f67"/>
+              <a:gd name="f84" fmla="?: f56 f74 f73"/>
+              <a:gd name="f85" fmla="?: f56 f73 f74"/>
+              <a:gd name="f86" fmla="?: f57 f72 f71"/>
+              <a:gd name="f87" fmla="?: f42 f78 f79"/>
+              <a:gd name="f88" fmla="?: f42 f76 f77"/>
+              <a:gd name="f89" fmla="*/ f80 3163 1"/>
+              <a:gd name="f90" fmla="?: f53 f82 f83"/>
+              <a:gd name="f91" fmla="?: f57 f85 f84"/>
+              <a:gd name="f92" fmla="*/ f89 1 7636"/>
+              <a:gd name="f93" fmla="+- f7 f92 0"/>
+              <a:gd name="f94" fmla="+- f30 0 f92"/>
+              <a:gd name="f95" fmla="+- f31 0 f92"/>
+              <a:gd name="f96" fmla="*/ f93 f29 1"/>
+              <a:gd name="f97" fmla="*/ f94 f29 1"/>
+              <a:gd name="f98" fmla="*/ f95 f29 1"/>
+            </a:gdLst>
+            <a:ahLst>
+              <a:ahXY gdRefX="f0" minX="f7" maxX="f10">
+                <a:pos x="f36" y="f37"/>
+              </a:ahXY>
+            </a:ahLst>
+            <a:cxnLst>
+              <a:cxn ang="3cd4">
+                <a:pos x="hc" y="t"/>
+              </a:cxn>
+              <a:cxn ang="0">
+                <a:pos x="r" y="vc"/>
+              </a:cxn>
+              <a:cxn ang="cd4">
+                <a:pos x="hc" y="b"/>
+              </a:cxn>
+              <a:cxn ang="cd2">
+                <a:pos x="l" y="vc"/>
+              </a:cxn>
+            </a:cxnLst>
+            <a:rect l="f96" t="f96" r="f97" b="f98"/>
+            <a:pathLst>
+              <a:path>
+                <a:moveTo>
+                  <a:pt x="f38" y="f37"/>
+                </a:moveTo>
+                <a:arcTo wR="f47" hR="f48" stAng="f81" swAng="f64"/>
+                <a:lnTo>
+                  <a:pt x="f37" y="f44"/>
+                </a:lnTo>
+                <a:arcTo wR="f48" hR="f65" stAng="f90" swAng="f68"/>
+                <a:lnTo>
+                  <a:pt x="f45" y="f39"/>
+                </a:lnTo>
+                <a:arcTo wR="f69" hR="f70" stAng="f91" swAng="f86"/>
+                <a:lnTo>
+                  <a:pt x="f40" y="f38"/>
+                </a:lnTo>
+                <a:arcTo wR="f75" hR="f47" stAng="f87" swAng="f88"/>
+                <a:close/>
+              </a:path>
+            </a:pathLst>
+          </a:custGeom>
+          <a:solidFill>
+            <a:srgbClr val="FFFFFF"/>
+          </a:solidFill>
+          <a:ln w="29160">
+            <a:solidFill>
+              <a:srgbClr val="3465A4"/>
+            </a:solidFill>
+            <a:prstDash val="solid"/>
+          </a:ln>
+        </p:spPr>
+        <p:txBody>
+          <a:bodyPr vert="horz" wrap="none" lIns="104400" tIns="59400" rIns="104400" bIns="59400" anchor="ctr" anchorCtr="0" compatLnSpc="0">
+            <a:noAutofit/>
+          </a:bodyPr>
+          <a:lstStyle/>
+          <a:p>
+            <a:r>
+              <a:rPr lang="ru-RU" sz="2400">
+                <a:latin typeface="Consolas" panose="020B0609020204030204" pitchFamily="49" charset="0"/>
+              </a:rPr>
+              <a:t>KernelName </a:t>
+            </a:r>
+            <a:r>
+              <a:rPr lang="en-US" sz="2400" b="0" i="0" u="none" strike="noStrike" kern="1200" cap="none">
+                <a:ln>
+                  <a:noFill/>
+                </a:ln>
+                <a:latin typeface="Consolas" panose="020B0609020204030204" pitchFamily="49" charset="0"/>
+                <a:ea typeface="Droid Sans Fallback" pitchFamily="2"/>
+                <a:cs typeface="FreeSans" pitchFamily="2"/>
+              </a:rPr>
+              <a:t>_ZTS14vector_add_bufIiE </a:t>
+            </a:r>
+            <a:br>
+              <a:rPr lang="en-US" sz="2400" b="0" i="0" u="none" strike="noStrike" kern="1200" cap="none">
+                <a:ln>
+                  <a:noFill/>
+                </a:ln>
+                <a:latin typeface="Consolas" panose="020B0609020204030204" pitchFamily="49" charset="0"/>
+                <a:ea typeface="Droid Sans Fallback" pitchFamily="2"/>
+                <a:cs typeface="FreeSans" pitchFamily="2"/>
+              </a:rPr>
+            </a:br>
+            <a:r>
+              <a:rPr lang="ru-RU" sz="2400">
+                <a:latin typeface="Consolas" panose="020B0609020204030204" pitchFamily="49" charset="0"/>
+              </a:rPr>
+              <a:t>Unidentified PatchToken:</a:t>
+            </a:r>
+          </a:p>
+          <a:p>
+            <a:r>
+              <a:rPr lang="en-US" sz="2400">
+                <a:latin typeface="Consolas" panose="020B0609020204030204" pitchFamily="49" charset="0"/>
+              </a:rPr>
+              <a:t> </a:t>
+            </a:r>
+            <a:r>
+              <a:rPr lang="ru-RU" sz="2400">
+                <a:latin typeface="Consolas" panose="020B0609020204030204" pitchFamily="49" charset="0"/>
+              </a:rPr>
+              <a:t> 4 Token 19</a:t>
+            </a:r>
+          </a:p>
+          <a:p>
+            <a:r>
+              <a:rPr lang="ru-RU" sz="2400">
+                <a:latin typeface="Consolas" panose="020B0609020204030204" pitchFamily="49" charset="0"/>
+              </a:rPr>
+              <a:t> </a:t>
+            </a:r>
+            <a:r>
+              <a:rPr lang="en-US" sz="2400">
+                <a:latin typeface="Consolas" panose="020B0609020204030204" pitchFamily="49" charset="0"/>
+              </a:rPr>
+              <a:t> </a:t>
+            </a:r>
+            <a:r>
+              <a:rPr lang="ru-RU" sz="2400">
+                <a:latin typeface="Consolas" panose="020B0609020204030204" pitchFamily="49" charset="0"/>
+              </a:rPr>
+              <a:t>4 Size 12</a:t>
+            </a:r>
+          </a:p>
+          <a:p>
+            <a:r>
+              <a:rPr lang="ru-RU" sz="2400">
+                <a:latin typeface="Consolas" panose="020B0609020204030204" pitchFamily="49" charset="0"/>
+              </a:rPr>
+              <a:t> </a:t>
+            </a:r>
+            <a:r>
+              <a:rPr lang="en-US" sz="2400">
+                <a:latin typeface="Consolas" panose="020B0609020204030204" pitchFamily="49" charset="0"/>
+              </a:rPr>
+              <a:t> </a:t>
+            </a:r>
+            <a:r>
+              <a:rPr lang="ru-RU" sz="2400">
+                <a:latin typeface="Consolas" panose="020B0609020204030204" pitchFamily="49" charset="0"/>
+              </a:rPr>
+              <a:t>Hex 0 0 0 0</a:t>
+            </a:r>
+            <a:endParaRPr lang="en-US" sz="2400">
+              <a:latin typeface="Consolas" panose="020B0609020204030204" pitchFamily="49" charset="0"/>
+            </a:endParaRPr>
+          </a:p>
+          <a:p>
+            <a:r>
+              <a:rPr lang="en-US" sz="2400">
+                <a:latin typeface="Consolas" panose="020B0609020204030204" pitchFamily="49" charset="0"/>
+              </a:rPr>
+              <a:t>Unidentified PatchToken:</a:t>
+            </a:r>
+          </a:p>
+          <a:p>
+            <a:r>
+              <a:rPr lang="en-US" sz="2400">
+                <a:latin typeface="Consolas" panose="020B0609020204030204" pitchFamily="49" charset="0"/>
+              </a:rPr>
+              <a:t>  4 Token 21</a:t>
+            </a:r>
+          </a:p>
+          <a:p>
+            <a:r>
+              <a:rPr lang="en-US" sz="2400">
+                <a:latin typeface="Consolas" panose="020B0609020204030204" pitchFamily="49" charset="0"/>
+              </a:rPr>
+              <a:t>  4 Size 24</a:t>
+            </a:r>
+          </a:p>
+          <a:p>
+            <a:r>
+              <a:rPr lang="en-US" sz="2400">
+                <a:latin typeface="Consolas" panose="020B0609020204030204" pitchFamily="49" charset="0"/>
+              </a:rPr>
+              <a:t>  Hex 0 0 0 0 0 0 0 0 0 0 0 0 0 1 0 0</a:t>
+            </a:r>
+          </a:p>
+        </p:txBody>
+      </p:sp>
+      <p:sp>
+        <p:nvSpPr>
           <p:cNvPr id="3" name="Заголовок 2">
             <a:extLst>
               <a:ext uri="{FF2B5EF4-FFF2-40B4-BE49-F238E27FC236}">
@@ -34673,31 +35371,6 @@
               <a:rPr lang="ru-RU" sz="5400"/>
               <a:t>Механизм патчтокенов</a:t>
             </a:r>
-          </a:p>
-        </p:txBody>
-      </p:sp>
-      <p:sp>
-        <p:nvSpPr>
-          <p:cNvPr id="4" name="Объект 3">
-            <a:extLst>
-              <a:ext uri="{FF2B5EF4-FFF2-40B4-BE49-F238E27FC236}">
-                <a16:creationId xmlns:a16="http://schemas.microsoft.com/office/drawing/2014/main" id="{55A33C70-5D92-4578-C7E5-2ABB721CAF72}"/>
-              </a:ext>
-            </a:extLst>
-          </p:cNvPr>
-          <p:cNvSpPr>
-            <a:spLocks noGrp="1"/>
-          </p:cNvSpPr>
-          <p:nvPr>
-            <p:ph idx="1"/>
-          </p:nvPr>
-        </p:nvSpPr>
-        <p:spPr/>
-        <p:txBody>
-          <a:bodyPr/>
-          <a:lstStyle/>
-          <a:p>
-            <a:endParaRPr lang="ru-RU"/>
           </a:p>
         </p:txBody>
       </p:sp>
@@ -34767,6 +35440,827 @@
           </a:prstGeom>
         </p:spPr>
       </p:pic>
+      <p:sp>
+        <p:nvSpPr>
+          <p:cNvPr id="6" name="TextBox 5">
+            <a:extLst>
+              <a:ext uri="{FF2B5EF4-FFF2-40B4-BE49-F238E27FC236}">
+                <a16:creationId xmlns:a16="http://schemas.microsoft.com/office/drawing/2014/main" id="{65DDF0F0-2039-76AD-4FA9-9D70D46852C0}"/>
+              </a:ext>
+            </a:extLst>
+          </p:cNvPr>
+          <p:cNvSpPr txBox="1"/>
+          <p:nvPr/>
+        </p:nvSpPr>
+        <p:spPr>
+          <a:xfrm>
+            <a:off x="443592" y="1677780"/>
+            <a:ext cx="9192451" cy="487850"/>
+          </a:xfrm>
+          <a:prstGeom prst="rect">
+            <a:avLst/>
+          </a:prstGeom>
+          <a:noFill/>
+          <a:ln w="6480">
+            <a:solidFill>
+              <a:srgbClr val="000000"/>
+            </a:solidFill>
+            <a:custDash>
+              <a:ds d="283333" sp="283333"/>
+              <a:ds d="283333" sp="283333"/>
+            </a:custDash>
+          </a:ln>
+        </p:spPr>
+        <p:txBody>
+          <a:bodyPr vert="horz" wrap="square" lIns="93240" tIns="48240" rIns="93240" bIns="48240" anchorCtr="0" compatLnSpc="0">
+            <a:spAutoFit/>
+          </a:bodyPr>
+          <a:lstStyle/>
+          <a:p>
+            <a:pPr marL="0" marR="0" lvl="0" indent="0" rtl="0" hangingPunct="0">
+              <a:lnSpc>
+                <a:spcPct val="100000"/>
+              </a:lnSpc>
+              <a:spcBef>
+                <a:spcPts val="0"/>
+              </a:spcBef>
+              <a:spcAft>
+                <a:spcPts val="0"/>
+              </a:spcAft>
+              <a:buNone/>
+              <a:tabLst/>
+            </a:pPr>
+            <a:r>
+              <a:rPr lang="en-US" sz="2600" b="0" i="0" u="none" strike="noStrike" kern="1200" cap="none">
+                <a:ln>
+                  <a:noFill/>
+                </a:ln>
+                <a:latin typeface="Consolas" panose="020B0609020204030204" pitchFamily="49" charset="0"/>
+                <a:ea typeface="Droid Sans Fallback" pitchFamily="2"/>
+                <a:cs typeface="FreeSans" pitchFamily="2"/>
+              </a:rPr>
+              <a:t>&gt; ocloc disasm -file kernel.bin -device tgllp</a:t>
+            </a:r>
+          </a:p>
+        </p:txBody>
+      </p:sp>
+      <p:sp>
+        <p:nvSpPr>
+          <p:cNvPr id="12" name="Полилиния: фигура 11">
+            <a:extLst>
+              <a:ext uri="{FF2B5EF4-FFF2-40B4-BE49-F238E27FC236}">
+                <a16:creationId xmlns:a16="http://schemas.microsoft.com/office/drawing/2014/main" id="{94A0BA03-AAA9-EE6C-E288-5CCA703996B3}"/>
+              </a:ext>
+            </a:extLst>
+          </p:cNvPr>
+          <p:cNvSpPr/>
+          <p:nvPr/>
+        </p:nvSpPr>
+        <p:spPr>
+          <a:xfrm>
+            <a:off x="5901291" y="2489578"/>
+            <a:ext cx="1628593" cy="640080"/>
+          </a:xfrm>
+          <a:custGeom>
+            <a:avLst>
+              <a:gd name="f0" fmla="val 3600"/>
+            </a:avLst>
+            <a:gdLst>
+              <a:gd name="f1" fmla="val 10800000"/>
+              <a:gd name="f2" fmla="val 5400000"/>
+              <a:gd name="f3" fmla="val 16200000"/>
+              <a:gd name="f4" fmla="val w"/>
+              <a:gd name="f5" fmla="val h"/>
+              <a:gd name="f6" fmla="val ss"/>
+              <a:gd name="f7" fmla="val 0"/>
+              <a:gd name="f8" fmla="*/ 5419351 1 1725033"/>
+              <a:gd name="f9" fmla="val 45"/>
+              <a:gd name="f10" fmla="val 10800"/>
+              <a:gd name="f11" fmla="val -2147483647"/>
+              <a:gd name="f12" fmla="val 2147483647"/>
+              <a:gd name="f13" fmla="abs f4"/>
+              <a:gd name="f14" fmla="abs f5"/>
+              <a:gd name="f15" fmla="abs f6"/>
+              <a:gd name="f16" fmla="*/ f8 1 180"/>
+              <a:gd name="f17" fmla="pin 0 f0 10800"/>
+              <a:gd name="f18" fmla="+- 0 0 f2"/>
+              <a:gd name="f19" fmla="?: f13 f4 1"/>
+              <a:gd name="f20" fmla="?: f14 f5 1"/>
+              <a:gd name="f21" fmla="?: f15 f6 1"/>
+              <a:gd name="f22" fmla="*/ f9 f16 1"/>
+              <a:gd name="f23" fmla="+- f7 f17 0"/>
+              <a:gd name="f24" fmla="*/ f19 1 21600"/>
+              <a:gd name="f25" fmla="*/ f20 1 21600"/>
+              <a:gd name="f26" fmla="*/ 21600 f19 1"/>
+              <a:gd name="f27" fmla="*/ 21600 f20 1"/>
+              <a:gd name="f28" fmla="+- 0 0 f22"/>
+              <a:gd name="f29" fmla="min f25 f24"/>
+              <a:gd name="f30" fmla="*/ f26 1 f21"/>
+              <a:gd name="f31" fmla="*/ f27 1 f21"/>
+              <a:gd name="f32" fmla="*/ f28 f1 1"/>
+              <a:gd name="f33" fmla="*/ f32 1 f8"/>
+              <a:gd name="f34" fmla="+- f31 0 f17"/>
+              <a:gd name="f35" fmla="+- f30 0 f17"/>
+              <a:gd name="f36" fmla="*/ f17 f29 1"/>
+              <a:gd name="f37" fmla="*/ f7 f29 1"/>
+              <a:gd name="f38" fmla="*/ f23 f29 1"/>
+              <a:gd name="f39" fmla="*/ f31 f29 1"/>
+              <a:gd name="f40" fmla="*/ f30 f29 1"/>
+              <a:gd name="f41" fmla="+- f33 0 f2"/>
+              <a:gd name="f42" fmla="+- f37 0 f38"/>
+              <a:gd name="f43" fmla="+- f38 0 f37"/>
+              <a:gd name="f44" fmla="*/ f34 f29 1"/>
+              <a:gd name="f45" fmla="*/ f35 f29 1"/>
+              <a:gd name="f46" fmla="cos 1 f41"/>
+              <a:gd name="f47" fmla="abs f42"/>
+              <a:gd name="f48" fmla="abs f43"/>
+              <a:gd name="f49" fmla="?: f42 f18 f2"/>
+              <a:gd name="f50" fmla="?: f42 f2 f18"/>
+              <a:gd name="f51" fmla="?: f42 f3 f2"/>
+              <a:gd name="f52" fmla="?: f42 f2 f3"/>
+              <a:gd name="f53" fmla="+- f39 0 f44"/>
+              <a:gd name="f54" fmla="?: f43 f18 f2"/>
+              <a:gd name="f55" fmla="?: f43 f2 f18"/>
+              <a:gd name="f56" fmla="+- f40 0 f45"/>
+              <a:gd name="f57" fmla="+- f44 0 f39"/>
+              <a:gd name="f58" fmla="+- f45 0 f40"/>
+              <a:gd name="f59" fmla="?: f42 0 f1"/>
+              <a:gd name="f60" fmla="?: f42 f1 0"/>
+              <a:gd name="f61" fmla="+- 0 0 f46"/>
+              <a:gd name="f62" fmla="?: f42 f52 f51"/>
+              <a:gd name="f63" fmla="?: f42 f51 f52"/>
+              <a:gd name="f64" fmla="?: f43 f50 f49"/>
+              <a:gd name="f65" fmla="abs f53"/>
+              <a:gd name="f66" fmla="?: f53 0 f1"/>
+              <a:gd name="f67" fmla="?: f53 f1 0"/>
+              <a:gd name="f68" fmla="?: f53 f54 f55"/>
+              <a:gd name="f69" fmla="abs f56"/>
+              <a:gd name="f70" fmla="abs f57"/>
+              <a:gd name="f71" fmla="?: f56 f18 f2"/>
+              <a:gd name="f72" fmla="?: f56 f2 f18"/>
+              <a:gd name="f73" fmla="?: f56 f3 f2"/>
+              <a:gd name="f74" fmla="?: f56 f2 f3"/>
+              <a:gd name="f75" fmla="abs f58"/>
+              <a:gd name="f76" fmla="?: f58 f18 f2"/>
+              <a:gd name="f77" fmla="?: f58 f2 f18"/>
+              <a:gd name="f78" fmla="?: f58 f60 f59"/>
+              <a:gd name="f79" fmla="?: f58 f59 f60"/>
+              <a:gd name="f80" fmla="*/ f17 f61 1"/>
+              <a:gd name="f81" fmla="?: f43 f63 f62"/>
+              <a:gd name="f82" fmla="?: f43 f67 f66"/>
+              <a:gd name="f83" fmla="?: f43 f66 f67"/>
+              <a:gd name="f84" fmla="?: f56 f74 f73"/>
+              <a:gd name="f85" fmla="?: f56 f73 f74"/>
+              <a:gd name="f86" fmla="?: f57 f72 f71"/>
+              <a:gd name="f87" fmla="?: f42 f78 f79"/>
+              <a:gd name="f88" fmla="?: f42 f76 f77"/>
+              <a:gd name="f89" fmla="*/ f80 3163 1"/>
+              <a:gd name="f90" fmla="?: f53 f82 f83"/>
+              <a:gd name="f91" fmla="?: f57 f85 f84"/>
+              <a:gd name="f92" fmla="*/ f89 1 7636"/>
+              <a:gd name="f93" fmla="+- f7 f92 0"/>
+              <a:gd name="f94" fmla="+- f30 0 f92"/>
+              <a:gd name="f95" fmla="+- f31 0 f92"/>
+              <a:gd name="f96" fmla="*/ f93 f29 1"/>
+              <a:gd name="f97" fmla="*/ f94 f29 1"/>
+              <a:gd name="f98" fmla="*/ f95 f29 1"/>
+            </a:gdLst>
+            <a:ahLst>
+              <a:ahXY gdRefX="f0" minX="f7" maxX="f10">
+                <a:pos x="f36" y="f37"/>
+              </a:ahXY>
+            </a:ahLst>
+            <a:cxnLst>
+              <a:cxn ang="3cd4">
+                <a:pos x="hc" y="t"/>
+              </a:cxn>
+              <a:cxn ang="0">
+                <a:pos x="r" y="vc"/>
+              </a:cxn>
+              <a:cxn ang="cd4">
+                <a:pos x="hc" y="b"/>
+              </a:cxn>
+              <a:cxn ang="cd2">
+                <a:pos x="l" y="vc"/>
+              </a:cxn>
+            </a:cxnLst>
+            <a:rect l="f96" t="f96" r="f97" b="f98"/>
+            <a:pathLst>
+              <a:path>
+                <a:moveTo>
+                  <a:pt x="f38" y="f37"/>
+                </a:moveTo>
+                <a:arcTo wR="f47" hR="f48" stAng="f81" swAng="f64"/>
+                <a:lnTo>
+                  <a:pt x="f37" y="f44"/>
+                </a:lnTo>
+                <a:arcTo wR="f48" hR="f65" stAng="f90" swAng="f68"/>
+                <a:lnTo>
+                  <a:pt x="f45" y="f39"/>
+                </a:lnTo>
+                <a:arcTo wR="f69" hR="f70" stAng="f91" swAng="f86"/>
+                <a:lnTo>
+                  <a:pt x="f40" y="f38"/>
+                </a:lnTo>
+                <a:arcTo wR="f75" hR="f47" stAng="f87" swAng="f88"/>
+                <a:close/>
+              </a:path>
+            </a:pathLst>
+          </a:custGeom>
+          <a:solidFill>
+            <a:srgbClr val="FFFFFF">
+              <a:alpha val="0"/>
+            </a:srgbClr>
+          </a:solidFill>
+          <a:ln w="29160">
+            <a:solidFill>
+              <a:srgbClr val="3465A4"/>
+            </a:solidFill>
+            <a:prstDash val="solid"/>
+          </a:ln>
+        </p:spPr>
+        <p:txBody>
+          <a:bodyPr vert="horz" wrap="none" lIns="104400" tIns="59400" rIns="104400" bIns="59400" anchor="ctr" anchorCtr="0" compatLnSpc="0">
+            <a:noAutofit/>
+          </a:bodyPr>
+          <a:lstStyle/>
+          <a:p>
+            <a:pPr marL="0" marR="0" lvl="0" indent="0" algn="ctr" rtl="0" hangingPunct="0">
+              <a:lnSpc>
+                <a:spcPct val="100000"/>
+              </a:lnSpc>
+              <a:spcBef>
+                <a:spcPts val="0"/>
+              </a:spcBef>
+              <a:spcAft>
+                <a:spcPts val="0"/>
+              </a:spcAft>
+              <a:buNone/>
+              <a:tabLst/>
+            </a:pPr>
+            <a:r>
+              <a:rPr lang="en-US" sz="2400" b="0" i="0" u="none" strike="noStrike" kern="1200" cap="none">
+                <a:ln>
+                  <a:noFill/>
+                </a:ln>
+                <a:latin typeface="Consolas" panose="020B0609020204030204" pitchFamily="49" charset="0"/>
+                <a:ea typeface="Droid Sans Fallback" pitchFamily="2"/>
+                <a:cs typeface="FreeSans" pitchFamily="2"/>
+              </a:rPr>
+              <a:t>PTM.txt</a:t>
+            </a:r>
+          </a:p>
+        </p:txBody>
+      </p:sp>
+      <p:sp>
+        <p:nvSpPr>
+          <p:cNvPr id="13" name="Полилиния: фигура 12">
+            <a:extLst>
+              <a:ext uri="{FF2B5EF4-FFF2-40B4-BE49-F238E27FC236}">
+                <a16:creationId xmlns:a16="http://schemas.microsoft.com/office/drawing/2014/main" id="{3A6E8C94-4935-576C-FAC6-EC1E9FA0E380}"/>
+              </a:ext>
+            </a:extLst>
+          </p:cNvPr>
+          <p:cNvSpPr/>
+          <p:nvPr/>
+        </p:nvSpPr>
+        <p:spPr>
+          <a:xfrm rot="16200000">
+            <a:off x="5133286" y="2581018"/>
+            <a:ext cx="548640" cy="548640"/>
+          </a:xfrm>
+          <a:custGeom>
+            <a:avLst>
+              <a:gd name="f0" fmla="val 11699"/>
+              <a:gd name="f1" fmla="val 6359"/>
+            </a:avLst>
+            <a:gdLst>
+              <a:gd name="f2" fmla="val w"/>
+              <a:gd name="f3" fmla="val h"/>
+              <a:gd name="f4" fmla="val 0"/>
+              <a:gd name="f5" fmla="val 21600"/>
+              <a:gd name="f6" fmla="val 10800"/>
+              <a:gd name="f7" fmla="*/ f2 1 21600"/>
+              <a:gd name="f8" fmla="*/ f3 1 21600"/>
+              <a:gd name="f9" fmla="pin 0 f1 10800"/>
+              <a:gd name="f10" fmla="pin 0 f0 21600"/>
+              <a:gd name="f11" fmla="val f9"/>
+              <a:gd name="f12" fmla="val f10"/>
+              <a:gd name="f13" fmla="+- 21600 0 f9"/>
+              <a:gd name="f14" fmla="*/ f9 f7 1"/>
+              <a:gd name="f15" fmla="*/ f10 f8 1"/>
+              <a:gd name="f16" fmla="*/ 0 f8 1"/>
+              <a:gd name="f17" fmla="+- 21600 0 f12"/>
+              <a:gd name="f18" fmla="*/ f11 f7 1"/>
+              <a:gd name="f19" fmla="*/ f13 f7 1"/>
+              <a:gd name="f20" fmla="*/ f17 f11 1"/>
+              <a:gd name="f21" fmla="*/ f20 1 10800"/>
+              <a:gd name="f22" fmla="+- f12 f21 0"/>
+              <a:gd name="f23" fmla="*/ f22 f8 1"/>
+            </a:gdLst>
+            <a:ahLst>
+              <a:ahXY gdRefX="f1" minX="f4" maxX="f6" gdRefY="f0" minY="f4" maxY="f5">
+                <a:pos x="f14" y="f15"/>
+              </a:ahXY>
+            </a:ahLst>
+            <a:cxnLst>
+              <a:cxn ang="3cd4">
+                <a:pos x="hc" y="t"/>
+              </a:cxn>
+              <a:cxn ang="0">
+                <a:pos x="r" y="vc"/>
+              </a:cxn>
+              <a:cxn ang="cd4">
+                <a:pos x="hc" y="b"/>
+              </a:cxn>
+              <a:cxn ang="cd2">
+                <a:pos x="l" y="vc"/>
+              </a:cxn>
+            </a:cxnLst>
+            <a:rect l="f18" t="f16" r="f19" b="f23"/>
+            <a:pathLst>
+              <a:path w="21600" h="21600">
+                <a:moveTo>
+                  <a:pt x="f11" y="f4"/>
+                </a:moveTo>
+                <a:lnTo>
+                  <a:pt x="f11" y="f12"/>
+                </a:lnTo>
+                <a:lnTo>
+                  <a:pt x="f4" y="f12"/>
+                </a:lnTo>
+                <a:lnTo>
+                  <a:pt x="f6" y="f5"/>
+                </a:lnTo>
+                <a:lnTo>
+                  <a:pt x="f5" y="f12"/>
+                </a:lnTo>
+                <a:lnTo>
+                  <a:pt x="f13" y="f12"/>
+                </a:lnTo>
+                <a:lnTo>
+                  <a:pt x="f13" y="f4"/>
+                </a:lnTo>
+                <a:close/>
+              </a:path>
+            </a:pathLst>
+          </a:custGeom>
+          <a:solidFill>
+            <a:srgbClr val="FFFFFF"/>
+          </a:solidFill>
+          <a:ln w="29160">
+            <a:solidFill>
+              <a:srgbClr val="3465A4"/>
+            </a:solidFill>
+            <a:prstDash val="solid"/>
+          </a:ln>
+        </p:spPr>
+        <p:txBody>
+          <a:bodyPr wrap="none" lIns="104400" tIns="59400" rIns="104400" bIns="59400" anchor="ctr" anchorCtr="0" compatLnSpc="0">
+            <a:noAutofit/>
+          </a:bodyPr>
+          <a:lstStyle/>
+          <a:p>
+            <a:pPr marL="0" marR="0" lvl="0" indent="0" hangingPunct="0">
+              <a:lnSpc>
+                <a:spcPct val="100000"/>
+              </a:lnSpc>
+              <a:spcBef>
+                <a:spcPts val="0"/>
+              </a:spcBef>
+              <a:spcAft>
+                <a:spcPts val="0"/>
+              </a:spcAft>
+              <a:buNone/>
+              <a:tabLst/>
+            </a:pPr>
+            <a:endParaRPr lang="en-US" sz="1800" b="0" i="0" u="none" strike="noStrike" kern="1200" cap="none">
+              <a:ln>
+                <a:noFill/>
+              </a:ln>
+              <a:latin typeface="Liberation Sans" pitchFamily="18"/>
+              <a:ea typeface="Droid Sans Fallback" pitchFamily="2"/>
+              <a:cs typeface="FreeSans" pitchFamily="2"/>
+            </a:endParaRPr>
+          </a:p>
+        </p:txBody>
+      </p:sp>
+      <p:sp>
+        <p:nvSpPr>
+          <p:cNvPr id="14" name="Полилиния: фигура 13">
+            <a:extLst>
+              <a:ext uri="{FF2B5EF4-FFF2-40B4-BE49-F238E27FC236}">
+                <a16:creationId xmlns:a16="http://schemas.microsoft.com/office/drawing/2014/main" id="{1C7C4FF0-ECE0-55C2-72C7-4B933449725E}"/>
+              </a:ext>
+            </a:extLst>
+          </p:cNvPr>
+          <p:cNvSpPr/>
+          <p:nvPr/>
+        </p:nvSpPr>
+        <p:spPr>
+          <a:xfrm>
+            <a:off x="1090048" y="2535298"/>
+            <a:ext cx="1628593" cy="640080"/>
+          </a:xfrm>
+          <a:custGeom>
+            <a:avLst>
+              <a:gd name="f0" fmla="val 3600"/>
+            </a:avLst>
+            <a:gdLst>
+              <a:gd name="f1" fmla="val 10800000"/>
+              <a:gd name="f2" fmla="val 5400000"/>
+              <a:gd name="f3" fmla="val 16200000"/>
+              <a:gd name="f4" fmla="val w"/>
+              <a:gd name="f5" fmla="val h"/>
+              <a:gd name="f6" fmla="val ss"/>
+              <a:gd name="f7" fmla="val 0"/>
+              <a:gd name="f8" fmla="*/ 5419351 1 1725033"/>
+              <a:gd name="f9" fmla="val 45"/>
+              <a:gd name="f10" fmla="val 10800"/>
+              <a:gd name="f11" fmla="val -2147483647"/>
+              <a:gd name="f12" fmla="val 2147483647"/>
+              <a:gd name="f13" fmla="abs f4"/>
+              <a:gd name="f14" fmla="abs f5"/>
+              <a:gd name="f15" fmla="abs f6"/>
+              <a:gd name="f16" fmla="*/ f8 1 180"/>
+              <a:gd name="f17" fmla="pin 0 f0 10800"/>
+              <a:gd name="f18" fmla="+- 0 0 f2"/>
+              <a:gd name="f19" fmla="?: f13 f4 1"/>
+              <a:gd name="f20" fmla="?: f14 f5 1"/>
+              <a:gd name="f21" fmla="?: f15 f6 1"/>
+              <a:gd name="f22" fmla="*/ f9 f16 1"/>
+              <a:gd name="f23" fmla="+- f7 f17 0"/>
+              <a:gd name="f24" fmla="*/ f19 1 21600"/>
+              <a:gd name="f25" fmla="*/ f20 1 21600"/>
+              <a:gd name="f26" fmla="*/ 21600 f19 1"/>
+              <a:gd name="f27" fmla="*/ 21600 f20 1"/>
+              <a:gd name="f28" fmla="+- 0 0 f22"/>
+              <a:gd name="f29" fmla="min f25 f24"/>
+              <a:gd name="f30" fmla="*/ f26 1 f21"/>
+              <a:gd name="f31" fmla="*/ f27 1 f21"/>
+              <a:gd name="f32" fmla="*/ f28 f1 1"/>
+              <a:gd name="f33" fmla="*/ f32 1 f8"/>
+              <a:gd name="f34" fmla="+- f31 0 f17"/>
+              <a:gd name="f35" fmla="+- f30 0 f17"/>
+              <a:gd name="f36" fmla="*/ f17 f29 1"/>
+              <a:gd name="f37" fmla="*/ f7 f29 1"/>
+              <a:gd name="f38" fmla="*/ f23 f29 1"/>
+              <a:gd name="f39" fmla="*/ f31 f29 1"/>
+              <a:gd name="f40" fmla="*/ f30 f29 1"/>
+              <a:gd name="f41" fmla="+- f33 0 f2"/>
+              <a:gd name="f42" fmla="+- f37 0 f38"/>
+              <a:gd name="f43" fmla="+- f38 0 f37"/>
+              <a:gd name="f44" fmla="*/ f34 f29 1"/>
+              <a:gd name="f45" fmla="*/ f35 f29 1"/>
+              <a:gd name="f46" fmla="cos 1 f41"/>
+              <a:gd name="f47" fmla="abs f42"/>
+              <a:gd name="f48" fmla="abs f43"/>
+              <a:gd name="f49" fmla="?: f42 f18 f2"/>
+              <a:gd name="f50" fmla="?: f42 f2 f18"/>
+              <a:gd name="f51" fmla="?: f42 f3 f2"/>
+              <a:gd name="f52" fmla="?: f42 f2 f3"/>
+              <a:gd name="f53" fmla="+- f39 0 f44"/>
+              <a:gd name="f54" fmla="?: f43 f18 f2"/>
+              <a:gd name="f55" fmla="?: f43 f2 f18"/>
+              <a:gd name="f56" fmla="+- f40 0 f45"/>
+              <a:gd name="f57" fmla="+- f44 0 f39"/>
+              <a:gd name="f58" fmla="+- f45 0 f40"/>
+              <a:gd name="f59" fmla="?: f42 0 f1"/>
+              <a:gd name="f60" fmla="?: f42 f1 0"/>
+              <a:gd name="f61" fmla="+- 0 0 f46"/>
+              <a:gd name="f62" fmla="?: f42 f52 f51"/>
+              <a:gd name="f63" fmla="?: f42 f51 f52"/>
+              <a:gd name="f64" fmla="?: f43 f50 f49"/>
+              <a:gd name="f65" fmla="abs f53"/>
+              <a:gd name="f66" fmla="?: f53 0 f1"/>
+              <a:gd name="f67" fmla="?: f53 f1 0"/>
+              <a:gd name="f68" fmla="?: f53 f54 f55"/>
+              <a:gd name="f69" fmla="abs f56"/>
+              <a:gd name="f70" fmla="abs f57"/>
+              <a:gd name="f71" fmla="?: f56 f18 f2"/>
+              <a:gd name="f72" fmla="?: f56 f2 f18"/>
+              <a:gd name="f73" fmla="?: f56 f3 f2"/>
+              <a:gd name="f74" fmla="?: f56 f2 f3"/>
+              <a:gd name="f75" fmla="abs f58"/>
+              <a:gd name="f76" fmla="?: f58 f18 f2"/>
+              <a:gd name="f77" fmla="?: f58 f2 f18"/>
+              <a:gd name="f78" fmla="?: f58 f60 f59"/>
+              <a:gd name="f79" fmla="?: f58 f59 f60"/>
+              <a:gd name="f80" fmla="*/ f17 f61 1"/>
+              <a:gd name="f81" fmla="?: f43 f63 f62"/>
+              <a:gd name="f82" fmla="?: f43 f67 f66"/>
+              <a:gd name="f83" fmla="?: f43 f66 f67"/>
+              <a:gd name="f84" fmla="?: f56 f74 f73"/>
+              <a:gd name="f85" fmla="?: f56 f73 f74"/>
+              <a:gd name="f86" fmla="?: f57 f72 f71"/>
+              <a:gd name="f87" fmla="?: f42 f78 f79"/>
+              <a:gd name="f88" fmla="?: f42 f76 f77"/>
+              <a:gd name="f89" fmla="*/ f80 3163 1"/>
+              <a:gd name="f90" fmla="?: f53 f82 f83"/>
+              <a:gd name="f91" fmla="?: f57 f85 f84"/>
+              <a:gd name="f92" fmla="*/ f89 1 7636"/>
+              <a:gd name="f93" fmla="+- f7 f92 0"/>
+              <a:gd name="f94" fmla="+- f30 0 f92"/>
+              <a:gd name="f95" fmla="+- f31 0 f92"/>
+              <a:gd name="f96" fmla="*/ f93 f29 1"/>
+              <a:gd name="f97" fmla="*/ f94 f29 1"/>
+              <a:gd name="f98" fmla="*/ f95 f29 1"/>
+            </a:gdLst>
+            <a:ahLst>
+              <a:ahXY gdRefX="f0" minX="f7" maxX="f10">
+                <a:pos x="f36" y="f37"/>
+              </a:ahXY>
+            </a:ahLst>
+            <a:cxnLst>
+              <a:cxn ang="3cd4">
+                <a:pos x="hc" y="t"/>
+              </a:cxn>
+              <a:cxn ang="0">
+                <a:pos x="r" y="vc"/>
+              </a:cxn>
+              <a:cxn ang="cd4">
+                <a:pos x="hc" y="b"/>
+              </a:cxn>
+              <a:cxn ang="cd2">
+                <a:pos x="l" y="vc"/>
+              </a:cxn>
+            </a:cxnLst>
+            <a:rect l="f96" t="f96" r="f97" b="f98"/>
+            <a:pathLst>
+              <a:path>
+                <a:moveTo>
+                  <a:pt x="f38" y="f37"/>
+                </a:moveTo>
+                <a:arcTo wR="f47" hR="f48" stAng="f81" swAng="f64"/>
+                <a:lnTo>
+                  <a:pt x="f37" y="f44"/>
+                </a:lnTo>
+                <a:arcTo wR="f48" hR="f65" stAng="f90" swAng="f68"/>
+                <a:lnTo>
+                  <a:pt x="f45" y="f39"/>
+                </a:lnTo>
+                <a:arcTo wR="f69" hR="f70" stAng="f91" swAng="f86"/>
+                <a:lnTo>
+                  <a:pt x="f40" y="f38"/>
+                </a:lnTo>
+                <a:arcTo wR="f75" hR="f47" stAng="f87" swAng="f88"/>
+                <a:close/>
+              </a:path>
+            </a:pathLst>
+          </a:custGeom>
+          <a:solidFill>
+            <a:srgbClr val="FFFFFF">
+              <a:alpha val="0"/>
+            </a:srgbClr>
+          </a:solidFill>
+          <a:ln w="29160">
+            <a:solidFill>
+              <a:srgbClr val="3465A4"/>
+            </a:solidFill>
+            <a:prstDash val="solid"/>
+          </a:ln>
+        </p:spPr>
+        <p:txBody>
+          <a:bodyPr vert="horz" wrap="none" lIns="104400" tIns="59400" rIns="104400" bIns="59400" anchor="ctr" anchorCtr="0" compatLnSpc="0">
+            <a:noAutofit/>
+          </a:bodyPr>
+          <a:lstStyle/>
+          <a:p>
+            <a:pPr marL="0" marR="0" lvl="0" indent="0" algn="ctr" rtl="0" hangingPunct="0">
+              <a:lnSpc>
+                <a:spcPct val="100000"/>
+              </a:lnSpc>
+              <a:spcBef>
+                <a:spcPts val="0"/>
+              </a:spcBef>
+              <a:spcAft>
+                <a:spcPts val="0"/>
+              </a:spcAft>
+              <a:buNone/>
+              <a:tabLst/>
+            </a:pPr>
+            <a:r>
+              <a:rPr lang="en-US" sz="2400" b="0" i="0" u="none" strike="noStrike" kern="1200" cap="none">
+                <a:ln>
+                  <a:noFill/>
+                </a:ln>
+                <a:latin typeface="Consolas" panose="020B0609020204030204" pitchFamily="49" charset="0"/>
+                <a:ea typeface="Droid Sans Fallback" pitchFamily="2"/>
+                <a:cs typeface="FreeSans" pitchFamily="2"/>
+              </a:rPr>
+              <a:t>ocloc</a:t>
+            </a:r>
+          </a:p>
+        </p:txBody>
+      </p:sp>
+      <p:sp>
+        <p:nvSpPr>
+          <p:cNvPr id="15" name="Полилиния: фигура 14">
+            <a:extLst>
+              <a:ext uri="{FF2B5EF4-FFF2-40B4-BE49-F238E27FC236}">
+                <a16:creationId xmlns:a16="http://schemas.microsoft.com/office/drawing/2014/main" id="{B51BDAE7-69AD-A6CB-5EB9-50CCCEF18A40}"/>
+              </a:ext>
+            </a:extLst>
+          </p:cNvPr>
+          <p:cNvSpPr/>
+          <p:nvPr/>
+        </p:nvSpPr>
+        <p:spPr>
+          <a:xfrm>
+            <a:off x="2987866" y="2504699"/>
+            <a:ext cx="1926055" cy="640080"/>
+          </a:xfrm>
+          <a:custGeom>
+            <a:avLst>
+              <a:gd name="f0" fmla="val 3600"/>
+            </a:avLst>
+            <a:gdLst>
+              <a:gd name="f1" fmla="val 10800000"/>
+              <a:gd name="f2" fmla="val 5400000"/>
+              <a:gd name="f3" fmla="val 16200000"/>
+              <a:gd name="f4" fmla="val w"/>
+              <a:gd name="f5" fmla="val h"/>
+              <a:gd name="f6" fmla="val ss"/>
+              <a:gd name="f7" fmla="val 0"/>
+              <a:gd name="f8" fmla="*/ 5419351 1 1725033"/>
+              <a:gd name="f9" fmla="val 45"/>
+              <a:gd name="f10" fmla="val 10800"/>
+              <a:gd name="f11" fmla="val -2147483647"/>
+              <a:gd name="f12" fmla="val 2147483647"/>
+              <a:gd name="f13" fmla="abs f4"/>
+              <a:gd name="f14" fmla="abs f5"/>
+              <a:gd name="f15" fmla="abs f6"/>
+              <a:gd name="f16" fmla="*/ f8 1 180"/>
+              <a:gd name="f17" fmla="pin 0 f0 10800"/>
+              <a:gd name="f18" fmla="+- 0 0 f2"/>
+              <a:gd name="f19" fmla="?: f13 f4 1"/>
+              <a:gd name="f20" fmla="?: f14 f5 1"/>
+              <a:gd name="f21" fmla="?: f15 f6 1"/>
+              <a:gd name="f22" fmla="*/ f9 f16 1"/>
+              <a:gd name="f23" fmla="+- f7 f17 0"/>
+              <a:gd name="f24" fmla="*/ f19 1 21600"/>
+              <a:gd name="f25" fmla="*/ f20 1 21600"/>
+              <a:gd name="f26" fmla="*/ 21600 f19 1"/>
+              <a:gd name="f27" fmla="*/ 21600 f20 1"/>
+              <a:gd name="f28" fmla="+- 0 0 f22"/>
+              <a:gd name="f29" fmla="min f25 f24"/>
+              <a:gd name="f30" fmla="*/ f26 1 f21"/>
+              <a:gd name="f31" fmla="*/ f27 1 f21"/>
+              <a:gd name="f32" fmla="*/ f28 f1 1"/>
+              <a:gd name="f33" fmla="*/ f32 1 f8"/>
+              <a:gd name="f34" fmla="+- f31 0 f17"/>
+              <a:gd name="f35" fmla="+- f30 0 f17"/>
+              <a:gd name="f36" fmla="*/ f17 f29 1"/>
+              <a:gd name="f37" fmla="*/ f7 f29 1"/>
+              <a:gd name="f38" fmla="*/ f23 f29 1"/>
+              <a:gd name="f39" fmla="*/ f31 f29 1"/>
+              <a:gd name="f40" fmla="*/ f30 f29 1"/>
+              <a:gd name="f41" fmla="+- f33 0 f2"/>
+              <a:gd name="f42" fmla="+- f37 0 f38"/>
+              <a:gd name="f43" fmla="+- f38 0 f37"/>
+              <a:gd name="f44" fmla="*/ f34 f29 1"/>
+              <a:gd name="f45" fmla="*/ f35 f29 1"/>
+              <a:gd name="f46" fmla="cos 1 f41"/>
+              <a:gd name="f47" fmla="abs f42"/>
+              <a:gd name="f48" fmla="abs f43"/>
+              <a:gd name="f49" fmla="?: f42 f18 f2"/>
+              <a:gd name="f50" fmla="?: f42 f2 f18"/>
+              <a:gd name="f51" fmla="?: f42 f3 f2"/>
+              <a:gd name="f52" fmla="?: f42 f2 f3"/>
+              <a:gd name="f53" fmla="+- f39 0 f44"/>
+              <a:gd name="f54" fmla="?: f43 f18 f2"/>
+              <a:gd name="f55" fmla="?: f43 f2 f18"/>
+              <a:gd name="f56" fmla="+- f40 0 f45"/>
+              <a:gd name="f57" fmla="+- f44 0 f39"/>
+              <a:gd name="f58" fmla="+- f45 0 f40"/>
+              <a:gd name="f59" fmla="?: f42 0 f1"/>
+              <a:gd name="f60" fmla="?: f42 f1 0"/>
+              <a:gd name="f61" fmla="+- 0 0 f46"/>
+              <a:gd name="f62" fmla="?: f42 f52 f51"/>
+              <a:gd name="f63" fmla="?: f42 f51 f52"/>
+              <a:gd name="f64" fmla="?: f43 f50 f49"/>
+              <a:gd name="f65" fmla="abs f53"/>
+              <a:gd name="f66" fmla="?: f53 0 f1"/>
+              <a:gd name="f67" fmla="?: f53 f1 0"/>
+              <a:gd name="f68" fmla="?: f53 f54 f55"/>
+              <a:gd name="f69" fmla="abs f56"/>
+              <a:gd name="f70" fmla="abs f57"/>
+              <a:gd name="f71" fmla="?: f56 f18 f2"/>
+              <a:gd name="f72" fmla="?: f56 f2 f18"/>
+              <a:gd name="f73" fmla="?: f56 f3 f2"/>
+              <a:gd name="f74" fmla="?: f56 f2 f3"/>
+              <a:gd name="f75" fmla="abs f58"/>
+              <a:gd name="f76" fmla="?: f58 f18 f2"/>
+              <a:gd name="f77" fmla="?: f58 f2 f18"/>
+              <a:gd name="f78" fmla="?: f58 f60 f59"/>
+              <a:gd name="f79" fmla="?: f58 f59 f60"/>
+              <a:gd name="f80" fmla="*/ f17 f61 1"/>
+              <a:gd name="f81" fmla="?: f43 f63 f62"/>
+              <a:gd name="f82" fmla="?: f43 f67 f66"/>
+              <a:gd name="f83" fmla="?: f43 f66 f67"/>
+              <a:gd name="f84" fmla="?: f56 f74 f73"/>
+              <a:gd name="f85" fmla="?: f56 f73 f74"/>
+              <a:gd name="f86" fmla="?: f57 f72 f71"/>
+              <a:gd name="f87" fmla="?: f42 f78 f79"/>
+              <a:gd name="f88" fmla="?: f42 f76 f77"/>
+              <a:gd name="f89" fmla="*/ f80 3163 1"/>
+              <a:gd name="f90" fmla="?: f53 f82 f83"/>
+              <a:gd name="f91" fmla="?: f57 f85 f84"/>
+              <a:gd name="f92" fmla="*/ f89 1 7636"/>
+              <a:gd name="f93" fmla="+- f7 f92 0"/>
+              <a:gd name="f94" fmla="+- f30 0 f92"/>
+              <a:gd name="f95" fmla="+- f31 0 f92"/>
+              <a:gd name="f96" fmla="*/ f93 f29 1"/>
+              <a:gd name="f97" fmla="*/ f94 f29 1"/>
+              <a:gd name="f98" fmla="*/ f95 f29 1"/>
+            </a:gdLst>
+            <a:ahLst>
+              <a:ahXY gdRefX="f0" minX="f7" maxX="f10">
+                <a:pos x="f36" y="f37"/>
+              </a:ahXY>
+            </a:ahLst>
+            <a:cxnLst>
+              <a:cxn ang="3cd4">
+                <a:pos x="hc" y="t"/>
+              </a:cxn>
+              <a:cxn ang="0">
+                <a:pos x="r" y="vc"/>
+              </a:cxn>
+              <a:cxn ang="cd4">
+                <a:pos x="hc" y="b"/>
+              </a:cxn>
+              <a:cxn ang="cd2">
+                <a:pos x="l" y="vc"/>
+              </a:cxn>
+            </a:cxnLst>
+            <a:rect l="f96" t="f96" r="f97" b="f98"/>
+            <a:pathLst>
+              <a:path>
+                <a:moveTo>
+                  <a:pt x="f38" y="f37"/>
+                </a:moveTo>
+                <a:arcTo wR="f47" hR="f48" stAng="f81" swAng="f64"/>
+                <a:lnTo>
+                  <a:pt x="f37" y="f44"/>
+                </a:lnTo>
+                <a:arcTo wR="f48" hR="f65" stAng="f90" swAng="f68"/>
+                <a:lnTo>
+                  <a:pt x="f45" y="f39"/>
+                </a:lnTo>
+                <a:arcTo wR="f69" hR="f70" stAng="f91" swAng="f86"/>
+                <a:lnTo>
+                  <a:pt x="f40" y="f38"/>
+                </a:lnTo>
+                <a:arcTo wR="f75" hR="f47" stAng="f87" swAng="f88"/>
+                <a:close/>
+              </a:path>
+            </a:pathLst>
+          </a:custGeom>
+          <a:solidFill>
+            <a:srgbClr val="FFFFFF">
+              <a:alpha val="0"/>
+            </a:srgbClr>
+          </a:solidFill>
+          <a:ln w="29160">
+            <a:solidFill>
+              <a:srgbClr val="3465A4"/>
+            </a:solidFill>
+            <a:prstDash val="solid"/>
+          </a:ln>
+        </p:spPr>
+        <p:txBody>
+          <a:bodyPr vert="horz" wrap="none" lIns="104400" tIns="59400" rIns="104400" bIns="59400" anchor="ctr" anchorCtr="0" compatLnSpc="0">
+            <a:noAutofit/>
+          </a:bodyPr>
+          <a:lstStyle/>
+          <a:p>
+            <a:pPr marL="0" marR="0" lvl="0" indent="0" algn="ctr" rtl="0" hangingPunct="0">
+              <a:lnSpc>
+                <a:spcPct val="100000"/>
+              </a:lnSpc>
+              <a:spcBef>
+                <a:spcPts val="0"/>
+              </a:spcBef>
+              <a:spcAft>
+                <a:spcPts val="0"/>
+              </a:spcAft>
+              <a:buNone/>
+              <a:tabLst/>
+            </a:pPr>
+            <a:r>
+              <a:rPr lang="en-US" sz="2400" b="0" i="0" u="none" strike="noStrike" kern="1200" cap="none">
+                <a:ln>
+                  <a:noFill/>
+                </a:ln>
+                <a:latin typeface="Consolas" panose="020B0609020204030204" pitchFamily="49" charset="0"/>
+                <a:ea typeface="Droid Sans Fallback" pitchFamily="2"/>
+                <a:cs typeface="FreeSans" pitchFamily="2"/>
+              </a:rPr>
+              <a:t>kernel.bin</a:t>
+            </a:r>
+          </a:p>
+        </p:txBody>
+      </p:sp>
     </p:spTree>
     <p:extLst>
       <p:ext uri="{BB962C8B-B14F-4D97-AF65-F5344CB8AC3E}">
@@ -35170,6 +36664,553 @@
           </a:p>
         </p:txBody>
       </p:sp>
+      <p:sp>
+        <p:nvSpPr>
+          <p:cNvPr id="8" name="Объект 2">
+            <a:extLst>
+              <a:ext uri="{FF2B5EF4-FFF2-40B4-BE49-F238E27FC236}">
+                <a16:creationId xmlns:a16="http://schemas.microsoft.com/office/drawing/2014/main" id="{3C5A88E7-4D35-1E78-5763-BBF93B10918F}"/>
+              </a:ext>
+            </a:extLst>
+          </p:cNvPr>
+          <p:cNvSpPr txBox="1">
+            <a:spLocks/>
+          </p:cNvSpPr>
+          <p:nvPr/>
+        </p:nvSpPr>
+        <p:spPr>
+          <a:xfrm>
+            <a:off x="503999" y="1563480"/>
+            <a:ext cx="9192451" cy="1262159"/>
+          </a:xfrm>
+          <a:prstGeom prst="rect">
+            <a:avLst/>
+          </a:prstGeom>
+        </p:spPr>
+        <p:txBody>
+          <a:bodyPr/>
+          <a:lstStyle>
+            <a:lvl1pPr rtl="0" hangingPunct="0">
+              <a:spcBef>
+                <a:spcPts val="0"/>
+              </a:spcBef>
+              <a:spcAft>
+                <a:spcPts val="1417"/>
+              </a:spcAft>
+              <a:tabLst/>
+              <a:defRPr lang="en-US" sz="3200" b="0" i="0" u="none" strike="noStrike" kern="1200" cap="none">
+                <a:ln>
+                  <a:noFill/>
+                </a:ln>
+                <a:latin typeface="Liberation Sans" pitchFamily="18"/>
+              </a:defRPr>
+            </a:lvl1pPr>
+            <a:lvl2pPr marL="685800" indent="-228600" algn="l" defTabSz="914400" rtl="0" eaLnBrk="1" latinLnBrk="0" hangingPunct="1">
+              <a:lnSpc>
+                <a:spcPct val="90000"/>
+              </a:lnSpc>
+              <a:spcBef>
+                <a:spcPts val="500"/>
+              </a:spcBef>
+              <a:buFont typeface="Arial" panose="020B0604020202020204" pitchFamily="34" charset="0"/>
+              <a:buChar char="•"/>
+              <a:defRPr sz="2400" kern="1200">
+                <a:solidFill>
+                  <a:schemeClr val="tx1"/>
+                </a:solidFill>
+                <a:latin typeface="+mn-lt"/>
+                <a:ea typeface="+mn-ea"/>
+                <a:cs typeface="+mn-cs"/>
+              </a:defRPr>
+            </a:lvl2pPr>
+            <a:lvl3pPr marL="1143000" indent="-228600" algn="l" defTabSz="914400" rtl="0" eaLnBrk="1" latinLnBrk="0" hangingPunct="1">
+              <a:lnSpc>
+                <a:spcPct val="90000"/>
+              </a:lnSpc>
+              <a:spcBef>
+                <a:spcPts val="500"/>
+              </a:spcBef>
+              <a:buFont typeface="Arial" panose="020B0604020202020204" pitchFamily="34" charset="0"/>
+              <a:buChar char="•"/>
+              <a:defRPr sz="2000" kern="1200">
+                <a:solidFill>
+                  <a:schemeClr val="tx1"/>
+                </a:solidFill>
+                <a:latin typeface="+mn-lt"/>
+                <a:ea typeface="+mn-ea"/>
+                <a:cs typeface="+mn-cs"/>
+              </a:defRPr>
+            </a:lvl3pPr>
+            <a:lvl4pPr marL="1600200" indent="-228600" algn="l" defTabSz="914400" rtl="0" eaLnBrk="1" latinLnBrk="0" hangingPunct="1">
+              <a:lnSpc>
+                <a:spcPct val="90000"/>
+              </a:lnSpc>
+              <a:spcBef>
+                <a:spcPts val="500"/>
+              </a:spcBef>
+              <a:buFont typeface="Arial" panose="020B0604020202020204" pitchFamily="34" charset="0"/>
+              <a:buChar char="•"/>
+              <a:defRPr sz="1800" kern="1200">
+                <a:solidFill>
+                  <a:schemeClr val="tx1"/>
+                </a:solidFill>
+                <a:latin typeface="+mn-lt"/>
+                <a:ea typeface="+mn-ea"/>
+                <a:cs typeface="+mn-cs"/>
+              </a:defRPr>
+            </a:lvl4pPr>
+            <a:lvl5pPr marL="2057400" indent="-228600" algn="l" defTabSz="914400" rtl="0" eaLnBrk="1" latinLnBrk="0" hangingPunct="1">
+              <a:lnSpc>
+                <a:spcPct val="90000"/>
+              </a:lnSpc>
+              <a:spcBef>
+                <a:spcPts val="500"/>
+              </a:spcBef>
+              <a:buFont typeface="Arial" panose="020B0604020202020204" pitchFamily="34" charset="0"/>
+              <a:buChar char="•"/>
+              <a:defRPr sz="1800" kern="1200">
+                <a:solidFill>
+                  <a:schemeClr val="tx1"/>
+                </a:solidFill>
+                <a:latin typeface="+mn-lt"/>
+                <a:ea typeface="+mn-ea"/>
+                <a:cs typeface="+mn-cs"/>
+              </a:defRPr>
+            </a:lvl5pPr>
+            <a:lvl6pPr marL="2514600" indent="-228600" algn="l" defTabSz="914400" rtl="0" eaLnBrk="1" latinLnBrk="0" hangingPunct="1">
+              <a:lnSpc>
+                <a:spcPct val="90000"/>
+              </a:lnSpc>
+              <a:spcBef>
+                <a:spcPts val="500"/>
+              </a:spcBef>
+              <a:buFont typeface="Arial" panose="020B0604020202020204" pitchFamily="34" charset="0"/>
+              <a:buChar char="•"/>
+              <a:defRPr sz="1800" kern="1200">
+                <a:solidFill>
+                  <a:schemeClr val="tx1"/>
+                </a:solidFill>
+                <a:latin typeface="+mn-lt"/>
+                <a:ea typeface="+mn-ea"/>
+                <a:cs typeface="+mn-cs"/>
+              </a:defRPr>
+            </a:lvl6pPr>
+            <a:lvl7pPr marL="2971800" indent="-228600" algn="l" defTabSz="914400" rtl="0" eaLnBrk="1" latinLnBrk="0" hangingPunct="1">
+              <a:lnSpc>
+                <a:spcPct val="90000"/>
+              </a:lnSpc>
+              <a:spcBef>
+                <a:spcPts val="500"/>
+              </a:spcBef>
+              <a:buFont typeface="Arial" panose="020B0604020202020204" pitchFamily="34" charset="0"/>
+              <a:buChar char="•"/>
+              <a:defRPr sz="1800" kern="1200">
+                <a:solidFill>
+                  <a:schemeClr val="tx1"/>
+                </a:solidFill>
+                <a:latin typeface="+mn-lt"/>
+                <a:ea typeface="+mn-ea"/>
+                <a:cs typeface="+mn-cs"/>
+              </a:defRPr>
+            </a:lvl7pPr>
+            <a:lvl8pPr marL="3429000" indent="-228600" algn="l" defTabSz="914400" rtl="0" eaLnBrk="1" latinLnBrk="0" hangingPunct="1">
+              <a:lnSpc>
+                <a:spcPct val="90000"/>
+              </a:lnSpc>
+              <a:spcBef>
+                <a:spcPts val="500"/>
+              </a:spcBef>
+              <a:buFont typeface="Arial" panose="020B0604020202020204" pitchFamily="34" charset="0"/>
+              <a:buChar char="•"/>
+              <a:defRPr sz="1800" kern="1200">
+                <a:solidFill>
+                  <a:schemeClr val="tx1"/>
+                </a:solidFill>
+                <a:latin typeface="+mn-lt"/>
+                <a:ea typeface="+mn-ea"/>
+                <a:cs typeface="+mn-cs"/>
+              </a:defRPr>
+            </a:lvl8pPr>
+            <a:lvl9pPr marL="3886200" indent="-228600" algn="l" defTabSz="914400" rtl="0" eaLnBrk="1" latinLnBrk="0" hangingPunct="1">
+              <a:lnSpc>
+                <a:spcPct val="90000"/>
+              </a:lnSpc>
+              <a:spcBef>
+                <a:spcPts val="500"/>
+              </a:spcBef>
+              <a:buFont typeface="Arial" panose="020B0604020202020204" pitchFamily="34" charset="0"/>
+              <a:buChar char="•"/>
+              <a:defRPr sz="1800" kern="1200">
+                <a:solidFill>
+                  <a:schemeClr val="tx1"/>
+                </a:solidFill>
+                <a:latin typeface="+mn-lt"/>
+                <a:ea typeface="+mn-ea"/>
+                <a:cs typeface="+mn-cs"/>
+              </a:defRPr>
+            </a:lvl9pPr>
+          </a:lstStyle>
+          <a:p>
+            <a:pPr marL="342900" indent="-342900">
+              <a:buFont typeface="Arial" panose="020B0604020202020204" pitchFamily="34" charset="0"/>
+              <a:buChar char="•"/>
+            </a:pPr>
+            <a:r>
+              <a:rPr lang="ru-RU" sz="2400">
+                <a:solidFill>
+                  <a:sysClr val="windowText" lastClr="000000"/>
+                </a:solidFill>
+              </a:rPr>
+              <a:t>Настройки рантайма лежат в неочевидном месте: файле </a:t>
+            </a:r>
+            <a:r>
+              <a:rPr lang="en-US" sz="2400">
+                <a:solidFill>
+                  <a:sysClr val="windowText" lastClr="000000"/>
+                </a:solidFill>
+              </a:rPr>
+              <a:t>igdrcl.config, </a:t>
+            </a:r>
+            <a:r>
+              <a:rPr lang="ru-RU" sz="2400">
+                <a:solidFill>
+                  <a:sysClr val="windowText" lastClr="000000"/>
+                </a:solidFill>
+              </a:rPr>
+              <a:t>который вы можете создать в папке запуска программы</a:t>
+            </a:r>
+          </a:p>
+        </p:txBody>
+      </p:sp>
+      <p:sp>
+        <p:nvSpPr>
+          <p:cNvPr id="9" name="TextBox 8">
+            <a:extLst>
+              <a:ext uri="{FF2B5EF4-FFF2-40B4-BE49-F238E27FC236}">
+                <a16:creationId xmlns:a16="http://schemas.microsoft.com/office/drawing/2014/main" id="{1A932FD0-D870-B595-0E7C-6BABB2E9819C}"/>
+              </a:ext>
+            </a:extLst>
+          </p:cNvPr>
+          <p:cNvSpPr txBox="1"/>
+          <p:nvPr/>
+        </p:nvSpPr>
+        <p:spPr>
+          <a:xfrm>
+            <a:off x="551624" y="2998081"/>
+            <a:ext cx="9192451" cy="878277"/>
+          </a:xfrm>
+          <a:prstGeom prst="rect">
+            <a:avLst/>
+          </a:prstGeom>
+          <a:noFill/>
+          <a:ln w="6480">
+            <a:solidFill>
+              <a:srgbClr val="000000"/>
+            </a:solidFill>
+            <a:custDash>
+              <a:ds d="283333" sp="283333"/>
+              <a:ds d="283333" sp="283333"/>
+            </a:custDash>
+          </a:ln>
+        </p:spPr>
+        <p:txBody>
+          <a:bodyPr vert="horz" wrap="square" lIns="93240" tIns="48240" rIns="93240" bIns="48240" anchorCtr="0" compatLnSpc="0">
+            <a:spAutoFit/>
+          </a:bodyPr>
+          <a:lstStyle/>
+          <a:p>
+            <a:pPr marL="0" marR="0" lvl="0" indent="0" rtl="0" hangingPunct="0">
+              <a:lnSpc>
+                <a:spcPct val="100000"/>
+              </a:lnSpc>
+              <a:spcBef>
+                <a:spcPts val="0"/>
+              </a:spcBef>
+              <a:spcAft>
+                <a:spcPts val="0"/>
+              </a:spcAft>
+              <a:buNone/>
+              <a:tabLst/>
+            </a:pPr>
+            <a:r>
+              <a:rPr lang="en-US" sz="2600" b="0" i="0" u="none" strike="noStrike" kern="1200" cap="none">
+                <a:ln>
+                  <a:noFill/>
+                </a:ln>
+                <a:latin typeface="Consolas" panose="020B0609020204030204" pitchFamily="49" charset="0"/>
+                <a:ea typeface="Droid Sans Fallback" pitchFamily="2"/>
+                <a:cs typeface="FreeSans" pitchFamily="2"/>
+              </a:rPr>
+              <a:t>&gt; </a:t>
+            </a:r>
+            <a:r>
+              <a:rPr lang="en-US" sz="2600">
+                <a:latin typeface="Consolas" panose="020B0609020204030204" pitchFamily="49" charset="0"/>
+                <a:ea typeface="Droid Sans Fallback" pitchFamily="2"/>
+                <a:cs typeface="FreeSans" pitchFamily="2"/>
+              </a:rPr>
+              <a:t>ls</a:t>
+            </a:r>
+            <a:br>
+              <a:rPr lang="en-US" sz="2600">
+                <a:latin typeface="Consolas" panose="020B0609020204030204" pitchFamily="49" charset="0"/>
+                <a:ea typeface="Droid Sans Fallback" pitchFamily="2"/>
+                <a:cs typeface="FreeSans" pitchFamily="2"/>
+              </a:rPr>
+            </a:br>
+            <a:r>
+              <a:rPr lang="en-US" sz="2600">
+                <a:latin typeface="Consolas" panose="020B0609020204030204" pitchFamily="49" charset="0"/>
+                <a:ea typeface="Droid Sans Fallback" pitchFamily="2"/>
+                <a:cs typeface="FreeSans" pitchFamily="2"/>
+              </a:rPr>
+              <a:t>vectoradd.x igdrcl.config</a:t>
+            </a:r>
+            <a:endParaRPr lang="en-US" sz="2600" b="0" i="0" u="none" strike="noStrike" kern="1200" cap="none">
+              <a:ln>
+                <a:noFill/>
+              </a:ln>
+              <a:latin typeface="Consolas" panose="020B0609020204030204" pitchFamily="49" charset="0"/>
+              <a:ea typeface="Droid Sans Fallback" pitchFamily="2"/>
+              <a:cs typeface="FreeSans" pitchFamily="2"/>
+            </a:endParaRPr>
+          </a:p>
+        </p:txBody>
+      </p:sp>
+      <p:sp>
+        <p:nvSpPr>
+          <p:cNvPr id="10" name="Объект 2">
+            <a:extLst>
+              <a:ext uri="{FF2B5EF4-FFF2-40B4-BE49-F238E27FC236}">
+                <a16:creationId xmlns:a16="http://schemas.microsoft.com/office/drawing/2014/main" id="{B05685FD-8C10-4371-539B-2029C0FDBE01}"/>
+              </a:ext>
+            </a:extLst>
+          </p:cNvPr>
+          <p:cNvSpPr txBox="1">
+            <a:spLocks/>
+          </p:cNvSpPr>
+          <p:nvPr/>
+        </p:nvSpPr>
+        <p:spPr>
+          <a:xfrm>
+            <a:off x="551624" y="4048800"/>
+            <a:ext cx="9192451" cy="1262159"/>
+          </a:xfrm>
+          <a:prstGeom prst="rect">
+            <a:avLst/>
+          </a:prstGeom>
+        </p:spPr>
+        <p:txBody>
+          <a:bodyPr/>
+          <a:lstStyle>
+            <a:lvl1pPr rtl="0" hangingPunct="0">
+              <a:spcBef>
+                <a:spcPts val="0"/>
+              </a:spcBef>
+              <a:spcAft>
+                <a:spcPts val="1417"/>
+              </a:spcAft>
+              <a:tabLst/>
+              <a:defRPr lang="en-US" sz="3200" b="0" i="0" u="none" strike="noStrike" kern="1200" cap="none">
+                <a:ln>
+                  <a:noFill/>
+                </a:ln>
+                <a:latin typeface="Liberation Sans" pitchFamily="18"/>
+              </a:defRPr>
+            </a:lvl1pPr>
+            <a:lvl2pPr marL="685800" indent="-228600" algn="l" defTabSz="914400" rtl="0" eaLnBrk="1" latinLnBrk="0" hangingPunct="1">
+              <a:lnSpc>
+                <a:spcPct val="90000"/>
+              </a:lnSpc>
+              <a:spcBef>
+                <a:spcPts val="500"/>
+              </a:spcBef>
+              <a:buFont typeface="Arial" panose="020B0604020202020204" pitchFamily="34" charset="0"/>
+              <a:buChar char="•"/>
+              <a:defRPr sz="2400" kern="1200">
+                <a:solidFill>
+                  <a:schemeClr val="tx1"/>
+                </a:solidFill>
+                <a:latin typeface="+mn-lt"/>
+                <a:ea typeface="+mn-ea"/>
+                <a:cs typeface="+mn-cs"/>
+              </a:defRPr>
+            </a:lvl2pPr>
+            <a:lvl3pPr marL="1143000" indent="-228600" algn="l" defTabSz="914400" rtl="0" eaLnBrk="1" latinLnBrk="0" hangingPunct="1">
+              <a:lnSpc>
+                <a:spcPct val="90000"/>
+              </a:lnSpc>
+              <a:spcBef>
+                <a:spcPts val="500"/>
+              </a:spcBef>
+              <a:buFont typeface="Arial" panose="020B0604020202020204" pitchFamily="34" charset="0"/>
+              <a:buChar char="•"/>
+              <a:defRPr sz="2000" kern="1200">
+                <a:solidFill>
+                  <a:schemeClr val="tx1"/>
+                </a:solidFill>
+                <a:latin typeface="+mn-lt"/>
+                <a:ea typeface="+mn-ea"/>
+                <a:cs typeface="+mn-cs"/>
+              </a:defRPr>
+            </a:lvl3pPr>
+            <a:lvl4pPr marL="1600200" indent="-228600" algn="l" defTabSz="914400" rtl="0" eaLnBrk="1" latinLnBrk="0" hangingPunct="1">
+              <a:lnSpc>
+                <a:spcPct val="90000"/>
+              </a:lnSpc>
+              <a:spcBef>
+                <a:spcPts val="500"/>
+              </a:spcBef>
+              <a:buFont typeface="Arial" panose="020B0604020202020204" pitchFamily="34" charset="0"/>
+              <a:buChar char="•"/>
+              <a:defRPr sz="1800" kern="1200">
+                <a:solidFill>
+                  <a:schemeClr val="tx1"/>
+                </a:solidFill>
+                <a:latin typeface="+mn-lt"/>
+                <a:ea typeface="+mn-ea"/>
+                <a:cs typeface="+mn-cs"/>
+              </a:defRPr>
+            </a:lvl4pPr>
+            <a:lvl5pPr marL="2057400" indent="-228600" algn="l" defTabSz="914400" rtl="0" eaLnBrk="1" latinLnBrk="0" hangingPunct="1">
+              <a:lnSpc>
+                <a:spcPct val="90000"/>
+              </a:lnSpc>
+              <a:spcBef>
+                <a:spcPts val="500"/>
+              </a:spcBef>
+              <a:buFont typeface="Arial" panose="020B0604020202020204" pitchFamily="34" charset="0"/>
+              <a:buChar char="•"/>
+              <a:defRPr sz="1800" kern="1200">
+                <a:solidFill>
+                  <a:schemeClr val="tx1"/>
+                </a:solidFill>
+                <a:latin typeface="+mn-lt"/>
+                <a:ea typeface="+mn-ea"/>
+                <a:cs typeface="+mn-cs"/>
+              </a:defRPr>
+            </a:lvl5pPr>
+            <a:lvl6pPr marL="2514600" indent="-228600" algn="l" defTabSz="914400" rtl="0" eaLnBrk="1" latinLnBrk="0" hangingPunct="1">
+              <a:lnSpc>
+                <a:spcPct val="90000"/>
+              </a:lnSpc>
+              <a:spcBef>
+                <a:spcPts val="500"/>
+              </a:spcBef>
+              <a:buFont typeface="Arial" panose="020B0604020202020204" pitchFamily="34" charset="0"/>
+              <a:buChar char="•"/>
+              <a:defRPr sz="1800" kern="1200">
+                <a:solidFill>
+                  <a:schemeClr val="tx1"/>
+                </a:solidFill>
+                <a:latin typeface="+mn-lt"/>
+                <a:ea typeface="+mn-ea"/>
+                <a:cs typeface="+mn-cs"/>
+              </a:defRPr>
+            </a:lvl6pPr>
+            <a:lvl7pPr marL="2971800" indent="-228600" algn="l" defTabSz="914400" rtl="0" eaLnBrk="1" latinLnBrk="0" hangingPunct="1">
+              <a:lnSpc>
+                <a:spcPct val="90000"/>
+              </a:lnSpc>
+              <a:spcBef>
+                <a:spcPts val="500"/>
+              </a:spcBef>
+              <a:buFont typeface="Arial" panose="020B0604020202020204" pitchFamily="34" charset="0"/>
+              <a:buChar char="•"/>
+              <a:defRPr sz="1800" kern="1200">
+                <a:solidFill>
+                  <a:schemeClr val="tx1"/>
+                </a:solidFill>
+                <a:latin typeface="+mn-lt"/>
+                <a:ea typeface="+mn-ea"/>
+                <a:cs typeface="+mn-cs"/>
+              </a:defRPr>
+            </a:lvl7pPr>
+            <a:lvl8pPr marL="3429000" indent="-228600" algn="l" defTabSz="914400" rtl="0" eaLnBrk="1" latinLnBrk="0" hangingPunct="1">
+              <a:lnSpc>
+                <a:spcPct val="90000"/>
+              </a:lnSpc>
+              <a:spcBef>
+                <a:spcPts val="500"/>
+              </a:spcBef>
+              <a:buFont typeface="Arial" panose="020B0604020202020204" pitchFamily="34" charset="0"/>
+              <a:buChar char="•"/>
+              <a:defRPr sz="1800" kern="1200">
+                <a:solidFill>
+                  <a:schemeClr val="tx1"/>
+                </a:solidFill>
+                <a:latin typeface="+mn-lt"/>
+                <a:ea typeface="+mn-ea"/>
+                <a:cs typeface="+mn-cs"/>
+              </a:defRPr>
+            </a:lvl8pPr>
+            <a:lvl9pPr marL="3886200" indent="-228600" algn="l" defTabSz="914400" rtl="0" eaLnBrk="1" latinLnBrk="0" hangingPunct="1">
+              <a:lnSpc>
+                <a:spcPct val="90000"/>
+              </a:lnSpc>
+              <a:spcBef>
+                <a:spcPts val="500"/>
+              </a:spcBef>
+              <a:buFont typeface="Arial" panose="020B0604020202020204" pitchFamily="34" charset="0"/>
+              <a:buChar char="•"/>
+              <a:defRPr sz="1800" kern="1200">
+                <a:solidFill>
+                  <a:schemeClr val="tx1"/>
+                </a:solidFill>
+                <a:latin typeface="+mn-lt"/>
+                <a:ea typeface="+mn-ea"/>
+                <a:cs typeface="+mn-cs"/>
+              </a:defRPr>
+            </a:lvl9pPr>
+          </a:lstStyle>
+          <a:p>
+            <a:pPr marL="342900" indent="-342900">
+              <a:buFont typeface="Arial" panose="020B0604020202020204" pitchFamily="34" charset="0"/>
+              <a:buChar char="•"/>
+            </a:pPr>
+            <a:r>
+              <a:rPr lang="ru-RU" sz="2400">
+                <a:solidFill>
+                  <a:sysClr val="windowText" lastClr="000000"/>
+                </a:solidFill>
+              </a:rPr>
+              <a:t>Можно изменить многое, например включить эмуляцию </a:t>
+            </a:r>
+            <a:r>
+              <a:rPr lang="en-US" sz="2400">
+                <a:solidFill>
+                  <a:sysClr val="windowText" lastClr="000000"/>
+                </a:solidFill>
+              </a:rPr>
+              <a:t>double-precision FP </a:t>
+            </a:r>
+            <a:r>
+              <a:rPr lang="ru-RU" sz="2400">
+                <a:solidFill>
+                  <a:sysClr val="windowText" lastClr="000000"/>
+                </a:solidFill>
+              </a:rPr>
+              <a:t>арифметики</a:t>
+            </a:r>
+            <a:r>
+              <a:rPr lang="en-US" sz="2400">
+                <a:solidFill>
+                  <a:sysClr val="windowText" lastClr="000000"/>
+                </a:solidFill>
+              </a:rPr>
+              <a:t> </a:t>
+            </a:r>
+            <a:r>
+              <a:rPr lang="ru-RU" sz="2400">
+                <a:solidFill>
+                  <a:sysClr val="windowText" lastClr="000000"/>
+                </a:solidFill>
+              </a:rPr>
+              <a:t>там, где она возможна.</a:t>
+            </a:r>
+          </a:p>
+        </p:txBody>
+      </p:sp>
     </p:spTree>
     <p:extLst>
       <p:ext uri="{BB962C8B-B14F-4D97-AF65-F5344CB8AC3E}">
@@ -35474,6 +37515,70 @@
     <p:extLst>
       <p:ext uri="{BB962C8B-B14F-4D97-AF65-F5344CB8AC3E}">
         <p14:creationId xmlns:p14="http://schemas.microsoft.com/office/powerpoint/2010/main" val="2388991716"/>
+      </p:ext>
+    </p:extLst>
+  </p:cSld>
+  <p:clrMapOvr>
+    <a:masterClrMapping/>
+  </p:clrMapOvr>
+</p:sld>
+</file>
+
+<file path=ppt/slides/slide50.xml><?xml version="1.0" encoding="utf-8"?>
+<p:sld xmlns:a="http://schemas.openxmlformats.org/drawingml/2006/main" xmlns:r="http://schemas.openxmlformats.org/officeDocument/2006/relationships" xmlns:p="http://schemas.openxmlformats.org/presentationml/2006/main">
+  <p:cSld>
+    <p:spTree>
+      <p:nvGrpSpPr>
+        <p:cNvPr id="1" name=""/>
+        <p:cNvGrpSpPr/>
+        <p:nvPr/>
+      </p:nvGrpSpPr>
+      <p:grpSpPr>
+        <a:xfrm>
+          <a:off x="0" y="0"/>
+          <a:ext cx="0" cy="0"/>
+          <a:chOff x="0" y="0"/>
+          <a:chExt cx="0" cy="0"/>
+        </a:xfrm>
+      </p:grpSpPr>
+      <p:sp>
+        <p:nvSpPr>
+          <p:cNvPr id="6" name="Заголовок 5">
+            <a:extLst>
+              <a:ext uri="{FF2B5EF4-FFF2-40B4-BE49-F238E27FC236}">
+                <a16:creationId xmlns:a16="http://schemas.microsoft.com/office/drawing/2014/main" id="{E3AAB81D-4E94-3B40-416E-93AB6BEA5E21}"/>
+              </a:ext>
+            </a:extLst>
+          </p:cNvPr>
+          <p:cNvSpPr>
+            <a:spLocks noGrp="1"/>
+          </p:cNvSpPr>
+          <p:nvPr>
+            <p:ph type="title"/>
+          </p:nvPr>
+        </p:nvSpPr>
+        <p:spPr>
+          <a:xfrm>
+            <a:off x="557008" y="3196920"/>
+            <a:ext cx="9071640" cy="1262160"/>
+          </a:xfrm>
+        </p:spPr>
+        <p:txBody>
+          <a:bodyPr/>
+          <a:lstStyle/>
+          <a:p>
+            <a:r>
+              <a:rPr lang="en-US" sz="8000"/>
+              <a:t>Q &amp; A</a:t>
+            </a:r>
+            <a:endParaRPr lang="ru-RU" sz="8000"/>
+          </a:p>
+        </p:txBody>
+      </p:sp>
+    </p:spTree>
+    <p:extLst>
+      <p:ext uri="{BB962C8B-B14F-4D97-AF65-F5344CB8AC3E}">
+        <p14:creationId xmlns:p14="http://schemas.microsoft.com/office/powerpoint/2010/main" val="4147105612"/>
       </p:ext>
     </p:extLst>
   </p:cSld>

</xml_diff>